<commit_message>
Added a new folder in which codes focus on grade category data on which Random Forest classifier has been implemented.Documentation has been updated.
</commit_message>
<xml_diff>
--- a/ANN Update Slides June FFSA Updated.pptx
+++ b/ANN Update Slides June FFSA Updated.pptx
@@ -122,7 +122,7 @@
   </p:defaultTextStyle>
   <p:extLst>
     <p:ext uri="{EFAFB233-063F-42B5-8137-9DF3F51BA10A}">
-      <p15:sldGuideLst xmlns:p15="http://schemas.microsoft.com/office/powerpoint/2012/main" xmlns="">
+      <p15:sldGuideLst xmlns="" xmlns:p15="http://schemas.microsoft.com/office/powerpoint/2012/main">
         <p15:guide id="1" orient="horz" pos="2160">
           <p15:clr>
             <a:srgbClr val="A4A3A4"/>
@@ -222,7 +222,7 @@
             <a:fld id="{B9F9F8A4-97E8-4F28-9B5F-7971819D8853}" type="datetimeFigureOut">
               <a:rPr lang="en-US" smtClean="0"/>
               <a:pPr/>
-              <a:t>7/5/2023</a:t>
+              <a:t>7/6/2023</a:t>
             </a:fld>
             <a:endParaRPr lang="en-US"/>
           </a:p>
@@ -562,7 +562,7 @@
     </p:spTree>
     <p:extLst>
       <p:ext uri="{BB962C8B-B14F-4D97-AF65-F5344CB8AC3E}">
-        <p14:creationId xmlns:p14="http://schemas.microsoft.com/office/powerpoint/2010/main" xmlns="" val="2105204157"/>
+        <p14:creationId xmlns="" xmlns:p14="http://schemas.microsoft.com/office/powerpoint/2010/main" val="2105204157"/>
       </p:ext>
     </p:extLst>
   </p:cSld>
@@ -647,7 +647,7 @@
     </p:spTree>
     <p:extLst>
       <p:ext uri="{BB962C8B-B14F-4D97-AF65-F5344CB8AC3E}">
-        <p14:creationId xmlns:p14="http://schemas.microsoft.com/office/powerpoint/2010/main" xmlns="" val="25229294"/>
+        <p14:creationId xmlns="" xmlns:p14="http://schemas.microsoft.com/office/powerpoint/2010/main" val="25229294"/>
       </p:ext>
     </p:extLst>
   </p:cSld>
@@ -732,7 +732,7 @@
     </p:spTree>
     <p:extLst>
       <p:ext uri="{BB962C8B-B14F-4D97-AF65-F5344CB8AC3E}">
-        <p14:creationId xmlns:p14="http://schemas.microsoft.com/office/powerpoint/2010/main" xmlns="" val="25229294"/>
+        <p14:creationId xmlns="" xmlns:p14="http://schemas.microsoft.com/office/powerpoint/2010/main" val="25229294"/>
       </p:ext>
     </p:extLst>
   </p:cSld>
@@ -817,7 +817,7 @@
     </p:spTree>
     <p:extLst>
       <p:ext uri="{BB962C8B-B14F-4D97-AF65-F5344CB8AC3E}">
-        <p14:creationId xmlns:p14="http://schemas.microsoft.com/office/powerpoint/2010/main" xmlns="" val="25229294"/>
+        <p14:creationId xmlns="" xmlns:p14="http://schemas.microsoft.com/office/powerpoint/2010/main" val="25229294"/>
       </p:ext>
     </p:extLst>
   </p:cSld>
@@ -902,7 +902,7 @@
     </p:spTree>
     <p:extLst>
       <p:ext uri="{BB962C8B-B14F-4D97-AF65-F5344CB8AC3E}">
-        <p14:creationId xmlns:p14="http://schemas.microsoft.com/office/powerpoint/2010/main" xmlns="" val="25229294"/>
+        <p14:creationId xmlns="" xmlns:p14="http://schemas.microsoft.com/office/powerpoint/2010/main" val="25229294"/>
       </p:ext>
     </p:extLst>
   </p:cSld>
@@ -987,7 +987,7 @@
     </p:spTree>
     <p:extLst>
       <p:ext uri="{BB962C8B-B14F-4D97-AF65-F5344CB8AC3E}">
-        <p14:creationId xmlns:p14="http://schemas.microsoft.com/office/powerpoint/2010/main" xmlns="" val="25229294"/>
+        <p14:creationId xmlns="" xmlns:p14="http://schemas.microsoft.com/office/powerpoint/2010/main" val="25229294"/>
       </p:ext>
     </p:extLst>
   </p:cSld>
@@ -1072,7 +1072,7 @@
     </p:spTree>
     <p:extLst>
       <p:ext uri="{BB962C8B-B14F-4D97-AF65-F5344CB8AC3E}">
-        <p14:creationId xmlns:p14="http://schemas.microsoft.com/office/powerpoint/2010/main" xmlns="" val="25229294"/>
+        <p14:creationId xmlns="" xmlns:p14="http://schemas.microsoft.com/office/powerpoint/2010/main" val="25229294"/>
       </p:ext>
     </p:extLst>
   </p:cSld>
@@ -1157,7 +1157,7 @@
     </p:spTree>
     <p:extLst>
       <p:ext uri="{BB962C8B-B14F-4D97-AF65-F5344CB8AC3E}">
-        <p14:creationId xmlns:p14="http://schemas.microsoft.com/office/powerpoint/2010/main" xmlns="" val="25229294"/>
+        <p14:creationId xmlns="" xmlns:p14="http://schemas.microsoft.com/office/powerpoint/2010/main" val="25229294"/>
       </p:ext>
     </p:extLst>
   </p:cSld>
@@ -1242,7 +1242,7 @@
     </p:spTree>
     <p:extLst>
       <p:ext uri="{BB962C8B-B14F-4D97-AF65-F5344CB8AC3E}">
-        <p14:creationId xmlns:p14="http://schemas.microsoft.com/office/powerpoint/2010/main" xmlns="" val="25229294"/>
+        <p14:creationId xmlns="" xmlns:p14="http://schemas.microsoft.com/office/powerpoint/2010/main" val="25229294"/>
       </p:ext>
     </p:extLst>
   </p:cSld>
@@ -1327,7 +1327,7 @@
     </p:spTree>
     <p:extLst>
       <p:ext uri="{BB962C8B-B14F-4D97-AF65-F5344CB8AC3E}">
-        <p14:creationId xmlns:p14="http://schemas.microsoft.com/office/powerpoint/2010/main" xmlns="" val="25229294"/>
+        <p14:creationId xmlns="" xmlns:p14="http://schemas.microsoft.com/office/powerpoint/2010/main" val="25229294"/>
       </p:ext>
     </p:extLst>
   </p:cSld>
@@ -1412,7 +1412,7 @@
     </p:spTree>
     <p:extLst>
       <p:ext uri="{BB962C8B-B14F-4D97-AF65-F5344CB8AC3E}">
-        <p14:creationId xmlns:p14="http://schemas.microsoft.com/office/powerpoint/2010/main" xmlns="" val="25229294"/>
+        <p14:creationId xmlns="" xmlns:p14="http://schemas.microsoft.com/office/powerpoint/2010/main" val="25229294"/>
       </p:ext>
     </p:extLst>
   </p:cSld>
@@ -1497,7 +1497,7 @@
     </p:spTree>
     <p:extLst>
       <p:ext uri="{BB962C8B-B14F-4D97-AF65-F5344CB8AC3E}">
-        <p14:creationId xmlns:p14="http://schemas.microsoft.com/office/powerpoint/2010/main" xmlns="" val="25229294"/>
+        <p14:creationId xmlns="" xmlns:p14="http://schemas.microsoft.com/office/powerpoint/2010/main" val="25229294"/>
       </p:ext>
     </p:extLst>
   </p:cSld>
@@ -1582,7 +1582,7 @@
     </p:spTree>
     <p:extLst>
       <p:ext uri="{BB962C8B-B14F-4D97-AF65-F5344CB8AC3E}">
-        <p14:creationId xmlns:p14="http://schemas.microsoft.com/office/powerpoint/2010/main" xmlns="" val="25229294"/>
+        <p14:creationId xmlns="" xmlns:p14="http://schemas.microsoft.com/office/powerpoint/2010/main" val="25229294"/>
       </p:ext>
     </p:extLst>
   </p:cSld>
@@ -1667,7 +1667,7 @@
     </p:spTree>
     <p:extLst>
       <p:ext uri="{BB962C8B-B14F-4D97-AF65-F5344CB8AC3E}">
-        <p14:creationId xmlns:p14="http://schemas.microsoft.com/office/powerpoint/2010/main" xmlns="" val="25229294"/>
+        <p14:creationId xmlns="" xmlns:p14="http://schemas.microsoft.com/office/powerpoint/2010/main" val="25229294"/>
       </p:ext>
     </p:extLst>
   </p:cSld>
@@ -1857,7 +1857,7 @@
             <a:fld id="{4BF5B084-0CBB-4CCB-9C97-BD746B5EA4C9}" type="datetimeFigureOut">
               <a:rPr lang="en-US" smtClean="0"/>
               <a:pPr/>
-              <a:t>7/5/2023</a:t>
+              <a:t>7/6/2023</a:t>
             </a:fld>
             <a:endParaRPr lang="en-US"/>
           </a:p>
@@ -2022,7 +2022,7 @@
             <a:fld id="{4BF5B084-0CBB-4CCB-9C97-BD746B5EA4C9}" type="datetimeFigureOut">
               <a:rPr lang="en-US" smtClean="0"/>
               <a:pPr/>
-              <a:t>7/5/2023</a:t>
+              <a:t>7/6/2023</a:t>
             </a:fld>
             <a:endParaRPr lang="en-US"/>
           </a:p>
@@ -2197,7 +2197,7 @@
             <a:fld id="{4BF5B084-0CBB-4CCB-9C97-BD746B5EA4C9}" type="datetimeFigureOut">
               <a:rPr lang="en-US" smtClean="0"/>
               <a:pPr/>
-              <a:t>7/5/2023</a:t>
+              <a:t>7/6/2023</a:t>
             </a:fld>
             <a:endParaRPr lang="en-US"/>
           </a:p>
@@ -2362,7 +2362,7 @@
             <a:fld id="{4BF5B084-0CBB-4CCB-9C97-BD746B5EA4C9}" type="datetimeFigureOut">
               <a:rPr lang="en-US" smtClean="0"/>
               <a:pPr/>
-              <a:t>7/5/2023</a:t>
+              <a:t>7/6/2023</a:t>
             </a:fld>
             <a:endParaRPr lang="en-US"/>
           </a:p>
@@ -2604,7 +2604,7 @@
             <a:fld id="{4BF5B084-0CBB-4CCB-9C97-BD746B5EA4C9}" type="datetimeFigureOut">
               <a:rPr lang="en-US" smtClean="0"/>
               <a:pPr/>
-              <a:t>7/5/2023</a:t>
+              <a:t>7/6/2023</a:t>
             </a:fld>
             <a:endParaRPr lang="en-US"/>
           </a:p>
@@ -2886,7 +2886,7 @@
             <a:fld id="{4BF5B084-0CBB-4CCB-9C97-BD746B5EA4C9}" type="datetimeFigureOut">
               <a:rPr lang="en-US" smtClean="0"/>
               <a:pPr/>
-              <a:t>7/5/2023</a:t>
+              <a:t>7/6/2023</a:t>
             </a:fld>
             <a:endParaRPr lang="en-US"/>
           </a:p>
@@ -3302,7 +3302,7 @@
             <a:fld id="{4BF5B084-0CBB-4CCB-9C97-BD746B5EA4C9}" type="datetimeFigureOut">
               <a:rPr lang="en-US" smtClean="0"/>
               <a:pPr/>
-              <a:t>7/5/2023</a:t>
+              <a:t>7/6/2023</a:t>
             </a:fld>
             <a:endParaRPr lang="en-US"/>
           </a:p>
@@ -3416,7 +3416,7 @@
             <a:fld id="{4BF5B084-0CBB-4CCB-9C97-BD746B5EA4C9}" type="datetimeFigureOut">
               <a:rPr lang="en-US" smtClean="0"/>
               <a:pPr/>
-              <a:t>7/5/2023</a:t>
+              <a:t>7/6/2023</a:t>
             </a:fld>
             <a:endParaRPr lang="en-US"/>
           </a:p>
@@ -3508,7 +3508,7 @@
             <a:fld id="{4BF5B084-0CBB-4CCB-9C97-BD746B5EA4C9}" type="datetimeFigureOut">
               <a:rPr lang="en-US" smtClean="0"/>
               <a:pPr/>
-              <a:t>7/5/2023</a:t>
+              <a:t>7/6/2023</a:t>
             </a:fld>
             <a:endParaRPr lang="en-US"/>
           </a:p>
@@ -3780,7 +3780,7 @@
             <a:fld id="{4BF5B084-0CBB-4CCB-9C97-BD746B5EA4C9}" type="datetimeFigureOut">
               <a:rPr lang="en-US" smtClean="0"/>
               <a:pPr/>
-              <a:t>7/5/2023</a:t>
+              <a:t>7/6/2023</a:t>
             </a:fld>
             <a:endParaRPr lang="en-US"/>
           </a:p>
@@ -4029,7 +4029,7 @@
             <a:fld id="{4BF5B084-0CBB-4CCB-9C97-BD746B5EA4C9}" type="datetimeFigureOut">
               <a:rPr lang="en-US" smtClean="0"/>
               <a:pPr/>
-              <a:t>7/5/2023</a:t>
+              <a:t>7/6/2023</a:t>
             </a:fld>
             <a:endParaRPr lang="en-US"/>
           </a:p>
@@ -4237,7 +4237,7 @@
             <a:fld id="{4BF5B084-0CBB-4CCB-9C97-BD746B5EA4C9}" type="datetimeFigureOut">
               <a:rPr lang="en-US" smtClean="0"/>
               <a:pPr/>
-              <a:t>7/5/2023</a:t>
+              <a:t>7/6/2023</a:t>
             </a:fld>
             <a:endParaRPr lang="en-US"/>
           </a:p>
@@ -4749,7 +4749,7 @@
           <a:blip r:embed="rId3" cstate="print">
             <a:extLst>
               <a:ext uri="{28A0092B-C50C-407E-A947-70E740481C1C}">
-                <a14:useLocalDpi xmlns:a14="http://schemas.microsoft.com/office/drawing/2010/main" xmlns="" val="0"/>
+                <a14:useLocalDpi xmlns="" xmlns:a14="http://schemas.microsoft.com/office/drawing/2010/main" val="0"/>
               </a:ext>
             </a:extLst>
           </a:blip>
@@ -4826,7 +4826,7 @@
           <p:cNvPr id="12" name="Picture 4" descr="MSc Cognitive Science Admission 2014-15, Indian Institute of Technology (IIT),  Gandhinagar">
             <a:extLst>
               <a:ext uri="{FF2B5EF4-FFF2-40B4-BE49-F238E27FC236}">
-                <a16:creationId xmlns:a16="http://schemas.microsoft.com/office/drawing/2014/main" xmlns="" id="{84C602A4-83A1-4E16-A980-2A9259BCC373}"/>
+                <a16:creationId xmlns="" xmlns:a16="http://schemas.microsoft.com/office/drawing/2014/main" id="{84C602A4-83A1-4E16-A980-2A9259BCC373}"/>
               </a:ext>
             </a:extLst>
           </p:cNvPr>
@@ -4839,7 +4839,7 @@
           <a:blip r:embed="rId5" cstate="print">
             <a:extLst>
               <a:ext uri="{28A0092B-C50C-407E-A947-70E740481C1C}">
-                <a14:useLocalDpi xmlns:a14="http://schemas.microsoft.com/office/drawing/2010/main" xmlns="" val="0"/>
+                <a14:useLocalDpi xmlns="" xmlns:a14="http://schemas.microsoft.com/office/drawing/2010/main" val="0"/>
               </a:ext>
             </a:extLst>
           </a:blip>
@@ -4859,7 +4859,7 @@
           <a:noFill/>
           <a:extLst>
             <a:ext uri="{909E8E84-426E-40DD-AFC4-6F175D3DCCD1}">
-              <a14:hiddenFill xmlns:a14="http://schemas.microsoft.com/office/drawing/2010/main" xmlns="">
+              <a14:hiddenFill xmlns="" xmlns:a14="http://schemas.microsoft.com/office/drawing/2010/main">
                 <a:solidFill>
                   <a:srgbClr val="FFFFFF"/>
                 </a:solidFill>
@@ -4871,7 +4871,7 @@
     </p:spTree>
     <p:extLst>
       <p:ext uri="{BB962C8B-B14F-4D97-AF65-F5344CB8AC3E}">
-        <p14:creationId xmlns:p14="http://schemas.microsoft.com/office/powerpoint/2010/main" xmlns="" val="798998915"/>
+        <p14:creationId xmlns="" xmlns:p14="http://schemas.microsoft.com/office/powerpoint/2010/main" val="798998915"/>
       </p:ext>
     </p:extLst>
   </p:cSld>
@@ -4975,7 +4975,7 @@
           <p:cNvPr id="20" name="Picture 4" descr="MSc Cognitive Science Admission 2014-15, Indian Institute of Technology (IIT),  Gandhinagar">
             <a:extLst>
               <a:ext uri="{FF2B5EF4-FFF2-40B4-BE49-F238E27FC236}">
-                <a16:creationId xmlns:a16="http://schemas.microsoft.com/office/drawing/2014/main" xmlns="" id="{84C602A4-83A1-4E16-A980-2A9259BCC373}"/>
+                <a16:creationId xmlns="" xmlns:a16="http://schemas.microsoft.com/office/drawing/2014/main" id="{84C602A4-83A1-4E16-A980-2A9259BCC373}"/>
               </a:ext>
             </a:extLst>
           </p:cNvPr>
@@ -4988,7 +4988,7 @@
           <a:blip r:embed="rId3" cstate="print">
             <a:extLst>
               <a:ext uri="{28A0092B-C50C-407E-A947-70E740481C1C}">
-                <a14:useLocalDpi xmlns:a14="http://schemas.microsoft.com/office/drawing/2010/main" xmlns="" val="0"/>
+                <a14:useLocalDpi xmlns="" xmlns:a14="http://schemas.microsoft.com/office/drawing/2010/main" val="0"/>
               </a:ext>
             </a:extLst>
           </a:blip>
@@ -5008,7 +5008,7 @@
           <a:noFill/>
           <a:extLst>
             <a:ext uri="{909E8E84-426E-40DD-AFC4-6F175D3DCCD1}">
-              <a14:hiddenFill xmlns:a14="http://schemas.microsoft.com/office/drawing/2010/main" xmlns="">
+              <a14:hiddenFill xmlns="" xmlns:a14="http://schemas.microsoft.com/office/drawing/2010/main">
                 <a:solidFill>
                   <a:srgbClr val="FFFFFF"/>
                 </a:solidFill>
@@ -5112,7 +5112,7 @@
           <p:cNvPr id="6" name="Picture 5">
             <a:extLst>
               <a:ext uri="{FF2B5EF4-FFF2-40B4-BE49-F238E27FC236}">
-                <a16:creationId xmlns:a16="http://schemas.microsoft.com/office/drawing/2014/main" xmlns="" id="{8E0D68E5-C559-77A6-3B81-5313A0A961F2}"/>
+                <a16:creationId xmlns="" xmlns:a16="http://schemas.microsoft.com/office/drawing/2014/main" id="{8E0D68E5-C559-77A6-3B81-5313A0A961F2}"/>
               </a:ext>
             </a:extLst>
           </p:cNvPr>
@@ -5125,7 +5125,7 @@
           <a:blip r:embed="rId4" cstate="print">
             <a:extLst>
               <a:ext uri="{28A0092B-C50C-407E-A947-70E740481C1C}">
-                <a14:useLocalDpi xmlns:a14="http://schemas.microsoft.com/office/drawing/2010/main" xmlns="" val="0"/>
+                <a14:useLocalDpi xmlns="" xmlns:a14="http://schemas.microsoft.com/office/drawing/2010/main" val="0"/>
               </a:ext>
             </a:extLst>
           </a:blip>
@@ -5148,7 +5148,7 @@
           <p:cNvPr id="2" name="Table 3">
             <a:extLst>
               <a:ext uri="{FF2B5EF4-FFF2-40B4-BE49-F238E27FC236}">
-                <a16:creationId xmlns:a16="http://schemas.microsoft.com/office/drawing/2014/main" xmlns="" id="{7B154797-2D6E-0657-51A2-67D08813F457}"/>
+                <a16:creationId xmlns="" xmlns:a16="http://schemas.microsoft.com/office/drawing/2014/main" id="{7B154797-2D6E-0657-51A2-67D08813F457}"/>
               </a:ext>
             </a:extLst>
           </p:cNvPr>
@@ -5158,7 +5158,7 @@
           <p:nvPr>
             <p:extLst>
               <p:ext uri="{D42A27DB-BD31-4B8C-83A1-F6EECF244321}">
-                <p14:modId xmlns:p14="http://schemas.microsoft.com/office/powerpoint/2010/main" xmlns="" val="1813915914"/>
+                <p14:modId xmlns="" xmlns:p14="http://schemas.microsoft.com/office/powerpoint/2010/main" val="1813915914"/>
               </p:ext>
             </p:extLst>
           </p:nvPr>
@@ -5178,14 +5178,14 @@
                 <a:gridCol w="5832988">
                   <a:extLst>
                     <a:ext uri="{9D8B030D-6E8A-4147-A177-3AD203B41FA5}">
-                      <a16:colId xmlns:a16="http://schemas.microsoft.com/office/drawing/2014/main" xmlns="" val="110231139"/>
+                      <a16:colId xmlns="" xmlns:a16="http://schemas.microsoft.com/office/drawing/2014/main" val="110231139"/>
                     </a:ext>
                   </a:extLst>
                 </a:gridCol>
                 <a:gridCol w="1634613">
                   <a:extLst>
                     <a:ext uri="{9D8B030D-6E8A-4147-A177-3AD203B41FA5}">
-                      <a16:colId xmlns:a16="http://schemas.microsoft.com/office/drawing/2014/main" xmlns="" val="2699121428"/>
+                      <a16:colId xmlns="" xmlns:a16="http://schemas.microsoft.com/office/drawing/2014/main" val="2699121428"/>
                     </a:ext>
                   </a:extLst>
                 </a:gridCol>
@@ -5232,7 +5232,7 @@
                 </a:tc>
                 <a:extLst>
                   <a:ext uri="{0D108BD9-81ED-4DB2-BD59-A6C34878D82A}">
-                    <a16:rowId xmlns:a16="http://schemas.microsoft.com/office/drawing/2014/main" xmlns="" val="2931909680"/>
+                    <a16:rowId xmlns="" xmlns:a16="http://schemas.microsoft.com/office/drawing/2014/main" val="2931909680"/>
                   </a:ext>
                 </a:extLst>
               </a:tr>
@@ -5478,7 +5478,7 @@
           <p:cNvPr id="4" name="TextBox 3">
             <a:extLst>
               <a:ext uri="{FF2B5EF4-FFF2-40B4-BE49-F238E27FC236}">
-                <a16:creationId xmlns:a16="http://schemas.microsoft.com/office/drawing/2014/main" xmlns="" id="{CA943360-CCDB-A34A-1BAE-75E33B3EF69D}"/>
+                <a16:creationId xmlns="" xmlns:a16="http://schemas.microsoft.com/office/drawing/2014/main" id="{CA943360-CCDB-A34A-1BAE-75E33B3EF69D}"/>
               </a:ext>
             </a:extLst>
           </p:cNvPr>
@@ -5537,7 +5537,7 @@
     </p:spTree>
     <p:extLst>
       <p:ext uri="{BB962C8B-B14F-4D97-AF65-F5344CB8AC3E}">
-        <p14:creationId xmlns:p14="http://schemas.microsoft.com/office/powerpoint/2010/main" xmlns="" val="3945166475"/>
+        <p14:creationId xmlns="" xmlns:p14="http://schemas.microsoft.com/office/powerpoint/2010/main" val="3945166475"/>
       </p:ext>
     </p:extLst>
   </p:cSld>
@@ -5641,7 +5641,7 @@
           <p:cNvPr id="20" name="Picture 4" descr="MSc Cognitive Science Admission 2014-15, Indian Institute of Technology (IIT),  Gandhinagar">
             <a:extLst>
               <a:ext uri="{FF2B5EF4-FFF2-40B4-BE49-F238E27FC236}">
-                <a16:creationId xmlns:a16="http://schemas.microsoft.com/office/drawing/2014/main" xmlns="" id="{84C602A4-83A1-4E16-A980-2A9259BCC373}"/>
+                <a16:creationId xmlns="" xmlns:a16="http://schemas.microsoft.com/office/drawing/2014/main" id="{84C602A4-83A1-4E16-A980-2A9259BCC373}"/>
               </a:ext>
             </a:extLst>
           </p:cNvPr>
@@ -5654,7 +5654,7 @@
           <a:blip r:embed="rId3" cstate="print">
             <a:extLst>
               <a:ext uri="{28A0092B-C50C-407E-A947-70E740481C1C}">
-                <a14:useLocalDpi xmlns:a14="http://schemas.microsoft.com/office/drawing/2010/main" xmlns="" val="0"/>
+                <a14:useLocalDpi xmlns="" xmlns:a14="http://schemas.microsoft.com/office/drawing/2010/main" val="0"/>
               </a:ext>
             </a:extLst>
           </a:blip>
@@ -5674,7 +5674,7 @@
           <a:noFill/>
           <a:extLst>
             <a:ext uri="{909E8E84-426E-40DD-AFC4-6F175D3DCCD1}">
-              <a14:hiddenFill xmlns:a14="http://schemas.microsoft.com/office/drawing/2010/main" xmlns="">
+              <a14:hiddenFill xmlns="" xmlns:a14="http://schemas.microsoft.com/office/drawing/2010/main">
                 <a:solidFill>
                   <a:srgbClr val="FFFFFF"/>
                 </a:solidFill>
@@ -5778,7 +5778,7 @@
           <p:cNvPr id="6" name="Picture 5">
             <a:extLst>
               <a:ext uri="{FF2B5EF4-FFF2-40B4-BE49-F238E27FC236}">
-                <a16:creationId xmlns:a16="http://schemas.microsoft.com/office/drawing/2014/main" xmlns="" id="{8E0D68E5-C559-77A6-3B81-5313A0A961F2}"/>
+                <a16:creationId xmlns="" xmlns:a16="http://schemas.microsoft.com/office/drawing/2014/main" id="{8E0D68E5-C559-77A6-3B81-5313A0A961F2}"/>
               </a:ext>
             </a:extLst>
           </p:cNvPr>
@@ -5791,7 +5791,7 @@
           <a:blip r:embed="rId4" cstate="print">
             <a:extLst>
               <a:ext uri="{28A0092B-C50C-407E-A947-70E740481C1C}">
-                <a14:useLocalDpi xmlns:a14="http://schemas.microsoft.com/office/drawing/2010/main" xmlns="" val="0"/>
+                <a14:useLocalDpi xmlns="" xmlns:a14="http://schemas.microsoft.com/office/drawing/2010/main" val="0"/>
               </a:ext>
             </a:extLst>
           </a:blip>
@@ -5814,7 +5814,7 @@
           <p:cNvPr id="2" name="Table 3">
             <a:extLst>
               <a:ext uri="{FF2B5EF4-FFF2-40B4-BE49-F238E27FC236}">
-                <a16:creationId xmlns:a16="http://schemas.microsoft.com/office/drawing/2014/main" xmlns="" id="{7B154797-2D6E-0657-51A2-67D08813F457}"/>
+                <a16:creationId xmlns="" xmlns:a16="http://schemas.microsoft.com/office/drawing/2014/main" id="{7B154797-2D6E-0657-51A2-67D08813F457}"/>
               </a:ext>
             </a:extLst>
           </p:cNvPr>
@@ -5824,14 +5824,14 @@
           <p:nvPr>
             <p:extLst>
               <p:ext uri="{D42A27DB-BD31-4B8C-83A1-F6EECF244321}">
-                <p14:modId xmlns:p14="http://schemas.microsoft.com/office/powerpoint/2010/main" xmlns="" val="1813915914"/>
+                <p14:modId xmlns="" xmlns:p14="http://schemas.microsoft.com/office/powerpoint/2010/main" val="1813915914"/>
               </p:ext>
             </p:extLst>
           </p:nvPr>
         </p:nvGraphicFramePr>
         <p:xfrm>
           <a:off x="457200" y="990600"/>
-          <a:ext cx="8001001" cy="4825041"/>
+          <a:ext cx="8001001" cy="4989757"/>
         </p:xfrm>
         <a:graphic>
           <a:graphicData uri="http://schemas.openxmlformats.org/drawingml/2006/table">
@@ -5844,14 +5844,14 @@
                 <a:gridCol w="5832988">
                   <a:extLst>
                     <a:ext uri="{9D8B030D-6E8A-4147-A177-3AD203B41FA5}">
-                      <a16:colId xmlns:a16="http://schemas.microsoft.com/office/drawing/2014/main" xmlns="" val="110231139"/>
+                      <a16:colId xmlns="" xmlns:a16="http://schemas.microsoft.com/office/drawing/2014/main" val="110231139"/>
                     </a:ext>
                   </a:extLst>
                 </a:gridCol>
                 <a:gridCol w="1634613">
                   <a:extLst>
                     <a:ext uri="{9D8B030D-6E8A-4147-A177-3AD203B41FA5}">
-                      <a16:colId xmlns:a16="http://schemas.microsoft.com/office/drawing/2014/main" xmlns="" val="2699121428"/>
+                      <a16:colId xmlns="" xmlns:a16="http://schemas.microsoft.com/office/drawing/2014/main" val="2699121428"/>
                     </a:ext>
                   </a:extLst>
                 </a:gridCol>
@@ -5888,7 +5888,18 @@
                       </a:r>
                       <a:r>
                         <a:rPr lang="en-US" sz="1800" baseline="0" dirty="0" smtClean="0"/>
-                        <a:t> the subset of 5 selected feature by one</a:t>
+                        <a:t> the subset of 5 selected feature by </a:t>
+                      </a:r>
+                      <a:r>
+                        <a:rPr lang="en-US" sz="1800" baseline="0" dirty="0" smtClean="0"/>
+                        <a:t>one. </a:t>
+                      </a:r>
+                    </a:p>
+                    <a:p>
+                      <a:pPr algn="ctr"/>
+                      <a:r>
+                        <a:rPr lang="en-US" sz="1800" baseline="0" dirty="0" smtClean="0"/>
+                        <a:t>Accuracy range (0.79-0.9)</a:t>
                       </a:r>
                       <a:endParaRPr lang="en-US" sz="1800" dirty="0" smtClean="0"/>
                     </a:p>
@@ -5915,7 +5926,7 @@
                 </a:tc>
                 <a:extLst>
                   <a:ext uri="{0D108BD9-81ED-4DB2-BD59-A6C34878D82A}">
-                    <a16:rowId xmlns:a16="http://schemas.microsoft.com/office/drawing/2014/main" xmlns="" val="2931909680"/>
+                    <a16:rowId xmlns="" xmlns:a16="http://schemas.microsoft.com/office/drawing/2014/main" val="2931909680"/>
                   </a:ext>
                 </a:extLst>
               </a:tr>
@@ -5965,11 +5976,7 @@
                       <a:pPr algn="ctr"/>
                       <a:r>
                         <a:rPr lang="en-US" sz="1400" dirty="0" smtClean="0"/>
-                        <a:t>67.2268</a:t>
-                      </a:r>
-                      <a:r>
-                        <a:rPr lang="en-US" sz="1400" dirty="0" smtClean="0"/>
-                        <a:t>%</a:t>
+                        <a:t>67.2268%</a:t>
                       </a:r>
                       <a:endParaRPr lang="en-US" sz="1400" dirty="0"/>
                     </a:p>
@@ -5985,7 +5992,7 @@
                 </a:tc>
                 <a:extLst>
                   <a:ext uri="{0D108BD9-81ED-4DB2-BD59-A6C34878D82A}">
-                    <a16:rowId xmlns:a16="http://schemas.microsoft.com/office/drawing/2014/main" xmlns="" val="3527519372"/>
+                    <a16:rowId xmlns="" xmlns:a16="http://schemas.microsoft.com/office/drawing/2014/main" val="3527519372"/>
                   </a:ext>
                 </a:extLst>
               </a:tr>
@@ -6078,7 +6085,7 @@
                 </a:tc>
                 <a:extLst>
                   <a:ext uri="{0D108BD9-81ED-4DB2-BD59-A6C34878D82A}">
-                    <a16:rowId xmlns:a16="http://schemas.microsoft.com/office/drawing/2014/main" xmlns="" val="2000888641"/>
+                    <a16:rowId xmlns="" xmlns:a16="http://schemas.microsoft.com/office/drawing/2014/main" val="2000888641"/>
                   </a:ext>
                 </a:extLst>
               </a:tr>
@@ -6152,7 +6159,7 @@
                 </a:tc>
                 <a:extLst>
                   <a:ext uri="{0D108BD9-81ED-4DB2-BD59-A6C34878D82A}">
-                    <a16:rowId xmlns:a16="http://schemas.microsoft.com/office/drawing/2014/main" xmlns="" val="2700886337"/>
+                    <a16:rowId xmlns="" xmlns:a16="http://schemas.microsoft.com/office/drawing/2014/main" val="2700886337"/>
                   </a:ext>
                 </a:extLst>
               </a:tr>
@@ -6226,7 +6233,7 @@
                 </a:tc>
                 <a:extLst>
                   <a:ext uri="{0D108BD9-81ED-4DB2-BD59-A6C34878D82A}">
-                    <a16:rowId xmlns:a16="http://schemas.microsoft.com/office/drawing/2014/main" xmlns="" val="4085207208"/>
+                    <a16:rowId xmlns="" xmlns:a16="http://schemas.microsoft.com/office/drawing/2014/main" val="4085207208"/>
                   </a:ext>
                 </a:extLst>
               </a:tr>
@@ -6575,7 +6582,7 @@
           <p:cNvPr id="4" name="TextBox 3">
             <a:extLst>
               <a:ext uri="{FF2B5EF4-FFF2-40B4-BE49-F238E27FC236}">
-                <a16:creationId xmlns:a16="http://schemas.microsoft.com/office/drawing/2014/main" xmlns="" id="{CA943360-CCDB-A34A-1BAE-75E33B3EF69D}"/>
+                <a16:creationId xmlns="" xmlns:a16="http://schemas.microsoft.com/office/drawing/2014/main" id="{CA943360-CCDB-A34A-1BAE-75E33B3EF69D}"/>
               </a:ext>
             </a:extLst>
           </p:cNvPr>
@@ -6633,7 +6640,7 @@
     </p:spTree>
     <p:extLst>
       <p:ext uri="{BB962C8B-B14F-4D97-AF65-F5344CB8AC3E}">
-        <p14:creationId xmlns:p14="http://schemas.microsoft.com/office/powerpoint/2010/main" xmlns="" val="3945166475"/>
+        <p14:creationId xmlns="" xmlns:p14="http://schemas.microsoft.com/office/powerpoint/2010/main" val="3945166475"/>
       </p:ext>
     </p:extLst>
   </p:cSld>
@@ -6737,7 +6744,7 @@
           <p:cNvPr id="20" name="Picture 4" descr="MSc Cognitive Science Admission 2014-15, Indian Institute of Technology (IIT),  Gandhinagar">
             <a:extLst>
               <a:ext uri="{FF2B5EF4-FFF2-40B4-BE49-F238E27FC236}">
-                <a16:creationId xmlns:a16="http://schemas.microsoft.com/office/drawing/2014/main" xmlns="" id="{84C602A4-83A1-4E16-A980-2A9259BCC373}"/>
+                <a16:creationId xmlns="" xmlns:a16="http://schemas.microsoft.com/office/drawing/2014/main" id="{84C602A4-83A1-4E16-A980-2A9259BCC373}"/>
               </a:ext>
             </a:extLst>
           </p:cNvPr>
@@ -6750,7 +6757,7 @@
           <a:blip r:embed="rId3" cstate="print">
             <a:extLst>
               <a:ext uri="{28A0092B-C50C-407E-A947-70E740481C1C}">
-                <a14:useLocalDpi xmlns:a14="http://schemas.microsoft.com/office/drawing/2010/main" xmlns="" val="0"/>
+                <a14:useLocalDpi xmlns="" xmlns:a14="http://schemas.microsoft.com/office/drawing/2010/main" val="0"/>
               </a:ext>
             </a:extLst>
           </a:blip>
@@ -6770,7 +6777,7 @@
           <a:noFill/>
           <a:extLst>
             <a:ext uri="{909E8E84-426E-40DD-AFC4-6F175D3DCCD1}">
-              <a14:hiddenFill xmlns:a14="http://schemas.microsoft.com/office/drawing/2010/main" xmlns="">
+              <a14:hiddenFill xmlns="" xmlns:a14="http://schemas.microsoft.com/office/drawing/2010/main">
                 <a:solidFill>
                   <a:srgbClr val="FFFFFF"/>
                 </a:solidFill>
@@ -6874,7 +6881,7 @@
           <p:cNvPr id="6" name="Picture 5">
             <a:extLst>
               <a:ext uri="{FF2B5EF4-FFF2-40B4-BE49-F238E27FC236}">
-                <a16:creationId xmlns:a16="http://schemas.microsoft.com/office/drawing/2014/main" xmlns="" id="{8E0D68E5-C559-77A6-3B81-5313A0A961F2}"/>
+                <a16:creationId xmlns="" xmlns:a16="http://schemas.microsoft.com/office/drawing/2014/main" id="{8E0D68E5-C559-77A6-3B81-5313A0A961F2}"/>
               </a:ext>
             </a:extLst>
           </p:cNvPr>
@@ -6887,7 +6894,7 @@
           <a:blip r:embed="rId4" cstate="print">
             <a:extLst>
               <a:ext uri="{28A0092B-C50C-407E-A947-70E740481C1C}">
-                <a14:useLocalDpi xmlns:a14="http://schemas.microsoft.com/office/drawing/2010/main" xmlns="" val="0"/>
+                <a14:useLocalDpi xmlns="" xmlns:a14="http://schemas.microsoft.com/office/drawing/2010/main" val="0"/>
               </a:ext>
             </a:extLst>
           </a:blip>
@@ -6910,7 +6917,7 @@
           <p:cNvPr id="2" name="Table 3">
             <a:extLst>
               <a:ext uri="{FF2B5EF4-FFF2-40B4-BE49-F238E27FC236}">
-                <a16:creationId xmlns:a16="http://schemas.microsoft.com/office/drawing/2014/main" xmlns="" id="{7B154797-2D6E-0657-51A2-67D08813F457}"/>
+                <a16:creationId xmlns="" xmlns:a16="http://schemas.microsoft.com/office/drawing/2014/main" id="{7B154797-2D6E-0657-51A2-67D08813F457}"/>
               </a:ext>
             </a:extLst>
           </p:cNvPr>
@@ -6920,14 +6927,14 @@
           <p:nvPr>
             <p:extLst>
               <p:ext uri="{D42A27DB-BD31-4B8C-83A1-F6EECF244321}">
-                <p14:modId xmlns:p14="http://schemas.microsoft.com/office/powerpoint/2010/main" xmlns="" val="1813915914"/>
+                <p14:modId xmlns="" xmlns:p14="http://schemas.microsoft.com/office/powerpoint/2010/main" val="1813915914"/>
               </p:ext>
             </p:extLst>
           </p:nvPr>
         </p:nvGraphicFramePr>
         <p:xfrm>
           <a:off x="457200" y="990600"/>
-          <a:ext cx="8001001" cy="4521869"/>
+          <a:ext cx="8001001" cy="5211151"/>
         </p:xfrm>
         <a:graphic>
           <a:graphicData uri="http://schemas.openxmlformats.org/drawingml/2006/table">
@@ -6940,14 +6947,14 @@
                 <a:gridCol w="5832988">
                   <a:extLst>
                     <a:ext uri="{9D8B030D-6E8A-4147-A177-3AD203B41FA5}">
-                      <a16:colId xmlns:a16="http://schemas.microsoft.com/office/drawing/2014/main" xmlns="" val="110231139"/>
+                      <a16:colId xmlns="" xmlns:a16="http://schemas.microsoft.com/office/drawing/2014/main" val="110231139"/>
                     </a:ext>
                   </a:extLst>
                 </a:gridCol>
                 <a:gridCol w="1634613">
                   <a:extLst>
                     <a:ext uri="{9D8B030D-6E8A-4147-A177-3AD203B41FA5}">
-                      <a16:colId xmlns:a16="http://schemas.microsoft.com/office/drawing/2014/main" xmlns="" val="2699121428"/>
+                      <a16:colId xmlns="" xmlns:a16="http://schemas.microsoft.com/office/drawing/2014/main" val="2699121428"/>
                     </a:ext>
                   </a:extLst>
                 </a:gridCol>
@@ -6972,17 +6979,32 @@
                       <a:pPr algn="ctr"/>
                       <a:r>
                         <a:rPr lang="en-US" sz="1200" dirty="0"/>
-                        <a:t> Statistical Features Selected from Forward Selection </a:t>
-                      </a:r>
-                      <a:r>
-                        <a:rPr lang="en-US" sz="1200" dirty="0" smtClean="0"/>
+                        <a:t> </a:t>
+                      </a:r>
+                      <a:r>
+                        <a:rPr lang="en-US" sz="1800" dirty="0"/>
+                        <a:t>Statistical Features Selected from Forward Selection </a:t>
+                      </a:r>
+                      <a:r>
+                        <a:rPr lang="en-US" sz="1800" dirty="0" smtClean="0"/>
                         <a:t>Algorithm Using Random Forest Classifier changing</a:t>
                       </a:r>
                       <a:r>
-                        <a:rPr lang="en-US" sz="1200" baseline="0" dirty="0" smtClean="0"/>
-                        <a:t> the subset of 5 selected feature by one</a:t>
-                      </a:r>
-                      <a:endParaRPr lang="en-US" sz="1200" dirty="0" smtClean="0"/>
+                        <a:rPr lang="en-US" sz="1800" baseline="0" dirty="0" smtClean="0"/>
+                        <a:t> the subset of 5 selected feature by </a:t>
+                      </a:r>
+                      <a:r>
+                        <a:rPr lang="en-US" sz="1800" baseline="0" dirty="0" smtClean="0"/>
+                        <a:t>one.</a:t>
+                      </a:r>
+                    </a:p>
+                    <a:p>
+                      <a:pPr algn="ctr"/>
+                      <a:r>
+                        <a:rPr lang="en-US" sz="1800" baseline="0" dirty="0" smtClean="0"/>
+                        <a:t>Accuracy Range (0.79-0.9)</a:t>
+                      </a:r>
+                      <a:endParaRPr lang="en-US" sz="1800" dirty="0" smtClean="0"/>
                     </a:p>
                     <a:p>
                       <a:pPr algn="ctr"/>
@@ -6998,7 +7020,7 @@
                     <a:p>
                       <a:pPr algn="ctr"/>
                       <a:r>
-                        <a:rPr lang="en-US" sz="1200" dirty="0"/>
+                        <a:rPr lang="en-US" sz="1800" dirty="0"/>
                         <a:t>Corresponding increase in accuracy</a:t>
                       </a:r>
                     </a:p>
@@ -7007,7 +7029,7 @@
                 </a:tc>
                 <a:extLst>
                   <a:ext uri="{0D108BD9-81ED-4DB2-BD59-A6C34878D82A}">
-                    <a16:rowId xmlns:a16="http://schemas.microsoft.com/office/drawing/2014/main" xmlns="" val="2931909680"/>
+                    <a16:rowId xmlns="" xmlns:a16="http://schemas.microsoft.com/office/drawing/2014/main" val="2931909680"/>
                   </a:ext>
                 </a:extLst>
               </a:tr>
@@ -7073,7 +7095,7 @@
                 </a:tc>
                 <a:extLst>
                   <a:ext uri="{0D108BD9-81ED-4DB2-BD59-A6C34878D82A}">
-                    <a16:rowId xmlns:a16="http://schemas.microsoft.com/office/drawing/2014/main" xmlns="" val="3527519372"/>
+                    <a16:rowId xmlns="" xmlns:a16="http://schemas.microsoft.com/office/drawing/2014/main" val="3527519372"/>
                   </a:ext>
                 </a:extLst>
               </a:tr>
@@ -7139,7 +7161,7 @@
                 </a:tc>
                 <a:extLst>
                   <a:ext uri="{0D108BD9-81ED-4DB2-BD59-A6C34878D82A}">
-                    <a16:rowId xmlns:a16="http://schemas.microsoft.com/office/drawing/2014/main" xmlns="" val="2000888641"/>
+                    <a16:rowId xmlns="" xmlns:a16="http://schemas.microsoft.com/office/drawing/2014/main" val="2000888641"/>
                   </a:ext>
                 </a:extLst>
               </a:tr>
@@ -7204,7 +7226,7 @@
                 </a:tc>
                 <a:extLst>
                   <a:ext uri="{0D108BD9-81ED-4DB2-BD59-A6C34878D82A}">
-                    <a16:rowId xmlns:a16="http://schemas.microsoft.com/office/drawing/2014/main" xmlns="" val="2700886337"/>
+                    <a16:rowId xmlns="" xmlns:a16="http://schemas.microsoft.com/office/drawing/2014/main" val="2700886337"/>
                   </a:ext>
                 </a:extLst>
               </a:tr>
@@ -7269,7 +7291,7 @@
                 </a:tc>
                 <a:extLst>
                   <a:ext uri="{0D108BD9-81ED-4DB2-BD59-A6C34878D82A}">
-                    <a16:rowId xmlns:a16="http://schemas.microsoft.com/office/drawing/2014/main" xmlns="" val="4085207208"/>
+                    <a16:rowId xmlns="" xmlns:a16="http://schemas.microsoft.com/office/drawing/2014/main" val="4085207208"/>
                   </a:ext>
                 </a:extLst>
               </a:tr>
@@ -7600,7 +7622,7 @@
           <p:cNvPr id="4" name="TextBox 3">
             <a:extLst>
               <a:ext uri="{FF2B5EF4-FFF2-40B4-BE49-F238E27FC236}">
-                <a16:creationId xmlns:a16="http://schemas.microsoft.com/office/drawing/2014/main" xmlns="" id="{CA943360-CCDB-A34A-1BAE-75E33B3EF69D}"/>
+                <a16:creationId xmlns="" xmlns:a16="http://schemas.microsoft.com/office/drawing/2014/main" id="{CA943360-CCDB-A34A-1BAE-75E33B3EF69D}"/>
               </a:ext>
             </a:extLst>
           </p:cNvPr>
@@ -7658,7 +7680,7 @@
     </p:spTree>
     <p:extLst>
       <p:ext uri="{BB962C8B-B14F-4D97-AF65-F5344CB8AC3E}">
-        <p14:creationId xmlns:p14="http://schemas.microsoft.com/office/powerpoint/2010/main" xmlns="" val="3945166475"/>
+        <p14:creationId xmlns="" xmlns:p14="http://schemas.microsoft.com/office/powerpoint/2010/main" val="3945166475"/>
       </p:ext>
     </p:extLst>
   </p:cSld>
@@ -7762,7 +7784,7 @@
           <p:cNvPr id="20" name="Picture 4" descr="MSc Cognitive Science Admission 2014-15, Indian Institute of Technology (IIT),  Gandhinagar">
             <a:extLst>
               <a:ext uri="{FF2B5EF4-FFF2-40B4-BE49-F238E27FC236}">
-                <a16:creationId xmlns:a16="http://schemas.microsoft.com/office/drawing/2014/main" xmlns="" id="{84C602A4-83A1-4E16-A980-2A9259BCC373}"/>
+                <a16:creationId xmlns="" xmlns:a16="http://schemas.microsoft.com/office/drawing/2014/main" id="{84C602A4-83A1-4E16-A980-2A9259BCC373}"/>
               </a:ext>
             </a:extLst>
           </p:cNvPr>
@@ -7775,7 +7797,7 @@
           <a:blip r:embed="rId3" cstate="print">
             <a:extLst>
               <a:ext uri="{28A0092B-C50C-407E-A947-70E740481C1C}">
-                <a14:useLocalDpi xmlns:a14="http://schemas.microsoft.com/office/drawing/2010/main" xmlns="" val="0"/>
+                <a14:useLocalDpi xmlns="" xmlns:a14="http://schemas.microsoft.com/office/drawing/2010/main" val="0"/>
               </a:ext>
             </a:extLst>
           </a:blip>
@@ -7795,7 +7817,7 @@
           <a:noFill/>
           <a:extLst>
             <a:ext uri="{909E8E84-426E-40DD-AFC4-6F175D3DCCD1}">
-              <a14:hiddenFill xmlns:a14="http://schemas.microsoft.com/office/drawing/2010/main" xmlns="">
+              <a14:hiddenFill xmlns="" xmlns:a14="http://schemas.microsoft.com/office/drawing/2010/main">
                 <a:solidFill>
                   <a:srgbClr val="FFFFFF"/>
                 </a:solidFill>
@@ -7899,7 +7921,7 @@
           <p:cNvPr id="6" name="Picture 5">
             <a:extLst>
               <a:ext uri="{FF2B5EF4-FFF2-40B4-BE49-F238E27FC236}">
-                <a16:creationId xmlns:a16="http://schemas.microsoft.com/office/drawing/2014/main" xmlns="" id="{8E0D68E5-C559-77A6-3B81-5313A0A961F2}"/>
+                <a16:creationId xmlns="" xmlns:a16="http://schemas.microsoft.com/office/drawing/2014/main" id="{8E0D68E5-C559-77A6-3B81-5313A0A961F2}"/>
               </a:ext>
             </a:extLst>
           </p:cNvPr>
@@ -7912,7 +7934,7 @@
           <a:blip r:embed="rId4" cstate="print">
             <a:extLst>
               <a:ext uri="{28A0092B-C50C-407E-A947-70E740481C1C}">
-                <a14:useLocalDpi xmlns:a14="http://schemas.microsoft.com/office/drawing/2010/main" xmlns="" val="0"/>
+                <a14:useLocalDpi xmlns="" xmlns:a14="http://schemas.microsoft.com/office/drawing/2010/main" val="0"/>
               </a:ext>
             </a:extLst>
           </a:blip>
@@ -7935,7 +7957,7 @@
           <p:cNvPr id="2" name="Table 3">
             <a:extLst>
               <a:ext uri="{FF2B5EF4-FFF2-40B4-BE49-F238E27FC236}">
-                <a16:creationId xmlns:a16="http://schemas.microsoft.com/office/drawing/2014/main" xmlns="" id="{7B154797-2D6E-0657-51A2-67D08813F457}"/>
+                <a16:creationId xmlns="" xmlns:a16="http://schemas.microsoft.com/office/drawing/2014/main" id="{7B154797-2D6E-0657-51A2-67D08813F457}"/>
               </a:ext>
             </a:extLst>
           </p:cNvPr>
@@ -7945,14 +7967,14 @@
           <p:nvPr>
             <p:extLst>
               <p:ext uri="{D42A27DB-BD31-4B8C-83A1-F6EECF244321}">
-                <p14:modId xmlns:p14="http://schemas.microsoft.com/office/powerpoint/2010/main" xmlns="" val="1813915914"/>
+                <p14:modId xmlns="" xmlns:p14="http://schemas.microsoft.com/office/powerpoint/2010/main" val="1813915914"/>
               </p:ext>
             </p:extLst>
           </p:nvPr>
         </p:nvGraphicFramePr>
         <p:xfrm>
           <a:off x="457200" y="990600"/>
-          <a:ext cx="8001001" cy="4800600"/>
+          <a:ext cx="8001001" cy="4946250"/>
         </p:xfrm>
         <a:graphic>
           <a:graphicData uri="http://schemas.openxmlformats.org/drawingml/2006/table">
@@ -7965,14 +7987,14 @@
                 <a:gridCol w="5832988">
                   <a:extLst>
                     <a:ext uri="{9D8B030D-6E8A-4147-A177-3AD203B41FA5}">
-                      <a16:colId xmlns:a16="http://schemas.microsoft.com/office/drawing/2014/main" xmlns="" val="110231139"/>
+                      <a16:colId xmlns="" xmlns:a16="http://schemas.microsoft.com/office/drawing/2014/main" val="110231139"/>
                     </a:ext>
                   </a:extLst>
                 </a:gridCol>
                 <a:gridCol w="1634613">
                   <a:extLst>
                     <a:ext uri="{9D8B030D-6E8A-4147-A177-3AD203B41FA5}">
-                      <a16:colId xmlns:a16="http://schemas.microsoft.com/office/drawing/2014/main" xmlns="" val="2699121428"/>
+                      <a16:colId xmlns="" xmlns:a16="http://schemas.microsoft.com/office/drawing/2014/main" val="2699121428"/>
                     </a:ext>
                   </a:extLst>
                 </a:gridCol>
@@ -8009,7 +8031,26 @@
                       </a:r>
                       <a:r>
                         <a:rPr lang="en-US" sz="1800" baseline="0" dirty="0" smtClean="0"/>
-                        <a:t> the subset of 5 selected feature by one</a:t>
+                        <a:t> the subset of </a:t>
+                      </a:r>
+                      <a:r>
+                        <a:rPr lang="en-US" sz="1800" baseline="0" dirty="0" smtClean="0"/>
+                        <a:t>2 </a:t>
+                      </a:r>
+                      <a:r>
+                        <a:rPr lang="en-US" sz="1800" baseline="0" dirty="0" smtClean="0"/>
+                        <a:t>selected feature by </a:t>
+                      </a:r>
+                      <a:r>
+                        <a:rPr lang="en-US" sz="1800" baseline="0" dirty="0" smtClean="0"/>
+                        <a:t>one.</a:t>
+                      </a:r>
+                    </a:p>
+                    <a:p>
+                      <a:pPr algn="ctr"/>
+                      <a:r>
+                        <a:rPr lang="en-US" sz="1800" baseline="0" dirty="0" smtClean="0"/>
+                        <a:t>Accuracy range (0.69-0.8)</a:t>
                       </a:r>
                       <a:endParaRPr lang="en-US" sz="1800" dirty="0" smtClean="0"/>
                     </a:p>
@@ -8036,7 +8077,7 @@
                 </a:tc>
                 <a:extLst>
                   <a:ext uri="{0D108BD9-81ED-4DB2-BD59-A6C34878D82A}">
-                    <a16:rowId xmlns:a16="http://schemas.microsoft.com/office/drawing/2014/main" xmlns="" val="2931909680"/>
+                    <a16:rowId xmlns="" xmlns:a16="http://schemas.microsoft.com/office/drawing/2014/main" val="2931909680"/>
                   </a:ext>
                 </a:extLst>
               </a:tr>
@@ -8093,7 +8134,7 @@
                 </a:tc>
                 <a:extLst>
                   <a:ext uri="{0D108BD9-81ED-4DB2-BD59-A6C34878D82A}">
-                    <a16:rowId xmlns:a16="http://schemas.microsoft.com/office/drawing/2014/main" xmlns="" val="3527519372"/>
+                    <a16:rowId xmlns="" xmlns:a16="http://schemas.microsoft.com/office/drawing/2014/main" val="3527519372"/>
                   </a:ext>
                 </a:extLst>
               </a:tr>
@@ -8159,7 +8200,7 @@
                 </a:tc>
                 <a:extLst>
                   <a:ext uri="{0D108BD9-81ED-4DB2-BD59-A6C34878D82A}">
-                    <a16:rowId xmlns:a16="http://schemas.microsoft.com/office/drawing/2014/main" xmlns="" val="2000888641"/>
+                    <a16:rowId xmlns="" xmlns:a16="http://schemas.microsoft.com/office/drawing/2014/main" val="2000888641"/>
                   </a:ext>
                 </a:extLst>
               </a:tr>
@@ -8216,7 +8257,7 @@
                 </a:tc>
                 <a:extLst>
                   <a:ext uri="{0D108BD9-81ED-4DB2-BD59-A6C34878D82A}">
-                    <a16:rowId xmlns:a16="http://schemas.microsoft.com/office/drawing/2014/main" xmlns="" val="2700886337"/>
+                    <a16:rowId xmlns="" xmlns:a16="http://schemas.microsoft.com/office/drawing/2014/main" val="2700886337"/>
                   </a:ext>
                 </a:extLst>
               </a:tr>
@@ -8273,7 +8314,7 @@
                 </a:tc>
                 <a:extLst>
                   <a:ext uri="{0D108BD9-81ED-4DB2-BD59-A6C34878D82A}">
-                    <a16:rowId xmlns:a16="http://schemas.microsoft.com/office/drawing/2014/main" xmlns="" val="4085207208"/>
+                    <a16:rowId xmlns="" xmlns:a16="http://schemas.microsoft.com/office/drawing/2014/main" val="4085207208"/>
                   </a:ext>
                 </a:extLst>
               </a:tr>
@@ -8581,7 +8622,7 @@
           <p:cNvPr id="4" name="TextBox 3">
             <a:extLst>
               <a:ext uri="{FF2B5EF4-FFF2-40B4-BE49-F238E27FC236}">
-                <a16:creationId xmlns:a16="http://schemas.microsoft.com/office/drawing/2014/main" xmlns="" id="{CA943360-CCDB-A34A-1BAE-75E33B3EF69D}"/>
+                <a16:creationId xmlns="" xmlns:a16="http://schemas.microsoft.com/office/drawing/2014/main" id="{CA943360-CCDB-A34A-1BAE-75E33B3EF69D}"/>
               </a:ext>
             </a:extLst>
           </p:cNvPr>
@@ -8640,7 +8681,7 @@
     </p:spTree>
     <p:extLst>
       <p:ext uri="{BB962C8B-B14F-4D97-AF65-F5344CB8AC3E}">
-        <p14:creationId xmlns:p14="http://schemas.microsoft.com/office/powerpoint/2010/main" xmlns="" val="3945166475"/>
+        <p14:creationId xmlns="" xmlns:p14="http://schemas.microsoft.com/office/powerpoint/2010/main" val="3945166475"/>
       </p:ext>
     </p:extLst>
   </p:cSld>
@@ -8744,7 +8785,7 @@
           <p:cNvPr id="20" name="Picture 4" descr="MSc Cognitive Science Admission 2014-15, Indian Institute of Technology (IIT),  Gandhinagar">
             <a:extLst>
               <a:ext uri="{FF2B5EF4-FFF2-40B4-BE49-F238E27FC236}">
-                <a16:creationId xmlns:a16="http://schemas.microsoft.com/office/drawing/2014/main" xmlns="" id="{84C602A4-83A1-4E16-A980-2A9259BCC373}"/>
+                <a16:creationId xmlns="" xmlns:a16="http://schemas.microsoft.com/office/drawing/2014/main" id="{84C602A4-83A1-4E16-A980-2A9259BCC373}"/>
               </a:ext>
             </a:extLst>
           </p:cNvPr>
@@ -8757,7 +8798,7 @@
           <a:blip r:embed="rId3" cstate="print">
             <a:extLst>
               <a:ext uri="{28A0092B-C50C-407E-A947-70E740481C1C}">
-                <a14:useLocalDpi xmlns:a14="http://schemas.microsoft.com/office/drawing/2010/main" xmlns="" val="0"/>
+                <a14:useLocalDpi xmlns="" xmlns:a14="http://schemas.microsoft.com/office/drawing/2010/main" val="0"/>
               </a:ext>
             </a:extLst>
           </a:blip>
@@ -8777,7 +8818,7 @@
           <a:noFill/>
           <a:extLst>
             <a:ext uri="{909E8E84-426E-40DD-AFC4-6F175D3DCCD1}">
-              <a14:hiddenFill xmlns:a14="http://schemas.microsoft.com/office/drawing/2010/main" xmlns="">
+              <a14:hiddenFill xmlns="" xmlns:a14="http://schemas.microsoft.com/office/drawing/2010/main">
                 <a:solidFill>
                   <a:srgbClr val="FFFFFF"/>
                 </a:solidFill>
@@ -8881,7 +8922,7 @@
           <p:cNvPr id="6" name="Picture 5">
             <a:extLst>
               <a:ext uri="{FF2B5EF4-FFF2-40B4-BE49-F238E27FC236}">
-                <a16:creationId xmlns:a16="http://schemas.microsoft.com/office/drawing/2014/main" xmlns="" id="{8E0D68E5-C559-77A6-3B81-5313A0A961F2}"/>
+                <a16:creationId xmlns="" xmlns:a16="http://schemas.microsoft.com/office/drawing/2014/main" id="{8E0D68E5-C559-77A6-3B81-5313A0A961F2}"/>
               </a:ext>
             </a:extLst>
           </p:cNvPr>
@@ -8894,7 +8935,7 @@
           <a:blip r:embed="rId4" cstate="print">
             <a:extLst>
               <a:ext uri="{28A0092B-C50C-407E-A947-70E740481C1C}">
-                <a14:useLocalDpi xmlns:a14="http://schemas.microsoft.com/office/drawing/2010/main" xmlns="" val="0"/>
+                <a14:useLocalDpi xmlns="" xmlns:a14="http://schemas.microsoft.com/office/drawing/2010/main" val="0"/>
               </a:ext>
             </a:extLst>
           </a:blip>
@@ -8917,7 +8958,7 @@
           <p:cNvPr id="2" name="Table 3">
             <a:extLst>
               <a:ext uri="{FF2B5EF4-FFF2-40B4-BE49-F238E27FC236}">
-                <a16:creationId xmlns:a16="http://schemas.microsoft.com/office/drawing/2014/main" xmlns="" id="{7B154797-2D6E-0657-51A2-67D08813F457}"/>
+                <a16:creationId xmlns="" xmlns:a16="http://schemas.microsoft.com/office/drawing/2014/main" id="{7B154797-2D6E-0657-51A2-67D08813F457}"/>
               </a:ext>
             </a:extLst>
           </p:cNvPr>
@@ -8927,14 +8968,14 @@
           <p:nvPr>
             <p:extLst>
               <p:ext uri="{D42A27DB-BD31-4B8C-83A1-F6EECF244321}">
-                <p14:modId xmlns:p14="http://schemas.microsoft.com/office/powerpoint/2010/main" xmlns="" val="1813915914"/>
+                <p14:modId xmlns="" xmlns:p14="http://schemas.microsoft.com/office/powerpoint/2010/main" val="1813915914"/>
               </p:ext>
             </p:extLst>
           </p:nvPr>
         </p:nvGraphicFramePr>
         <p:xfrm>
           <a:off x="457200" y="990601"/>
-          <a:ext cx="8001001" cy="5271211"/>
+          <a:ext cx="8001001" cy="5423611"/>
         </p:xfrm>
         <a:graphic>
           <a:graphicData uri="http://schemas.openxmlformats.org/drawingml/2006/table">
@@ -8947,14 +8988,14 @@
                 <a:gridCol w="5832988">
                   <a:extLst>
                     <a:ext uri="{9D8B030D-6E8A-4147-A177-3AD203B41FA5}">
-                      <a16:colId xmlns:a16="http://schemas.microsoft.com/office/drawing/2014/main" xmlns="" val="110231139"/>
+                      <a16:colId xmlns="" xmlns:a16="http://schemas.microsoft.com/office/drawing/2014/main" val="110231139"/>
                     </a:ext>
                   </a:extLst>
                 </a:gridCol>
                 <a:gridCol w="1634613">
                   <a:extLst>
                     <a:ext uri="{9D8B030D-6E8A-4147-A177-3AD203B41FA5}">
-                      <a16:colId xmlns:a16="http://schemas.microsoft.com/office/drawing/2014/main" xmlns="" val="2699121428"/>
+                      <a16:colId xmlns="" xmlns:a16="http://schemas.microsoft.com/office/drawing/2014/main" val="2699121428"/>
                     </a:ext>
                   </a:extLst>
                 </a:gridCol>
@@ -8987,7 +9028,42 @@
                       </a:r>
                       <a:r>
                         <a:rPr lang="en-US" sz="1400" baseline="0" dirty="0" smtClean="0"/>
-                        <a:t> the subset of 5 selected feature by one</a:t>
+                        <a:t> the subset of </a:t>
+                      </a:r>
+                      <a:r>
+                        <a:rPr lang="en-US" sz="1400" baseline="0" dirty="0" smtClean="0"/>
+                        <a:t>2 </a:t>
+                      </a:r>
+                      <a:r>
+                        <a:rPr lang="en-US" sz="1400" baseline="0" dirty="0" smtClean="0"/>
+                        <a:t>selected feature by </a:t>
+                      </a:r>
+                      <a:r>
+                        <a:rPr lang="en-US" sz="1400" baseline="0" dirty="0" smtClean="0"/>
+                        <a:t>one.</a:t>
+                      </a:r>
+                    </a:p>
+                    <a:p>
+                      <a:pPr marL="0" marR="0" indent="0" algn="ctr" defTabSz="914400" rtl="0" eaLnBrk="1" fontAlgn="auto" latinLnBrk="0" hangingPunct="1">
+                        <a:lnSpc>
+                          <a:spcPct val="100000"/>
+                        </a:lnSpc>
+                        <a:spcBef>
+                          <a:spcPts val="0"/>
+                        </a:spcBef>
+                        <a:spcAft>
+                          <a:spcPts val="0"/>
+                        </a:spcAft>
+                        <a:buClrTx/>
+                        <a:buSzTx/>
+                        <a:buFontTx/>
+                        <a:buNone/>
+                        <a:tabLst/>
+                        <a:defRPr/>
+                      </a:pPr>
+                      <a:r>
+                        <a:rPr lang="en-US" sz="1400" baseline="0" dirty="0" smtClean="0"/>
+                        <a:t>Accuracy range (0.69-0.8)</a:t>
                       </a:r>
                       <a:endParaRPr lang="en-US" sz="1400" dirty="0" smtClean="0"/>
                     </a:p>
@@ -9014,7 +9090,7 @@
                 </a:tc>
                 <a:extLst>
                   <a:ext uri="{0D108BD9-81ED-4DB2-BD59-A6C34878D82A}">
-                    <a16:rowId xmlns:a16="http://schemas.microsoft.com/office/drawing/2014/main" xmlns="" val="2931909680"/>
+                    <a16:rowId xmlns="" xmlns:a16="http://schemas.microsoft.com/office/drawing/2014/main" val="2931909680"/>
                   </a:ext>
                 </a:extLst>
               </a:tr>
@@ -9072,7 +9148,7 @@
                 </a:tc>
                 <a:extLst>
                   <a:ext uri="{0D108BD9-81ED-4DB2-BD59-A6C34878D82A}">
-                    <a16:rowId xmlns:a16="http://schemas.microsoft.com/office/drawing/2014/main" xmlns="" val="3527519372"/>
+                    <a16:rowId xmlns="" xmlns:a16="http://schemas.microsoft.com/office/drawing/2014/main" val="3527519372"/>
                   </a:ext>
                 </a:extLst>
               </a:tr>
@@ -9138,7 +9214,7 @@
                 </a:tc>
                 <a:extLst>
                   <a:ext uri="{0D108BD9-81ED-4DB2-BD59-A6C34878D82A}">
-                    <a16:rowId xmlns:a16="http://schemas.microsoft.com/office/drawing/2014/main" xmlns="" val="2000888641"/>
+                    <a16:rowId xmlns="" xmlns:a16="http://schemas.microsoft.com/office/drawing/2014/main" val="2000888641"/>
                   </a:ext>
                 </a:extLst>
               </a:tr>
@@ -9203,7 +9279,7 @@
                 </a:tc>
                 <a:extLst>
                   <a:ext uri="{0D108BD9-81ED-4DB2-BD59-A6C34878D82A}">
-                    <a16:rowId xmlns:a16="http://schemas.microsoft.com/office/drawing/2014/main" xmlns="" val="2700886337"/>
+                    <a16:rowId xmlns="" xmlns:a16="http://schemas.microsoft.com/office/drawing/2014/main" val="2700886337"/>
                   </a:ext>
                 </a:extLst>
               </a:tr>
@@ -9268,7 +9344,7 @@
                 </a:tc>
                 <a:extLst>
                   <a:ext uri="{0D108BD9-81ED-4DB2-BD59-A6C34878D82A}">
-                    <a16:rowId xmlns:a16="http://schemas.microsoft.com/office/drawing/2014/main" xmlns="" val="4085207208"/>
+                    <a16:rowId xmlns="" xmlns:a16="http://schemas.microsoft.com/office/drawing/2014/main" val="4085207208"/>
                   </a:ext>
                 </a:extLst>
               </a:tr>
@@ -9864,7 +9940,7 @@
           <p:cNvPr id="4" name="TextBox 3">
             <a:extLst>
               <a:ext uri="{FF2B5EF4-FFF2-40B4-BE49-F238E27FC236}">
-                <a16:creationId xmlns:a16="http://schemas.microsoft.com/office/drawing/2014/main" xmlns="" id="{CA943360-CCDB-A34A-1BAE-75E33B3EF69D}"/>
+                <a16:creationId xmlns="" xmlns:a16="http://schemas.microsoft.com/office/drawing/2014/main" id="{CA943360-CCDB-A34A-1BAE-75E33B3EF69D}"/>
               </a:ext>
             </a:extLst>
           </p:cNvPr>
@@ -9923,7 +9999,7 @@
     </p:spTree>
     <p:extLst>
       <p:ext uri="{BB962C8B-B14F-4D97-AF65-F5344CB8AC3E}">
-        <p14:creationId xmlns:p14="http://schemas.microsoft.com/office/powerpoint/2010/main" xmlns="" val="3945166475"/>
+        <p14:creationId xmlns="" xmlns:p14="http://schemas.microsoft.com/office/powerpoint/2010/main" val="3945166475"/>
       </p:ext>
     </p:extLst>
   </p:cSld>
@@ -10027,7 +10103,7 @@
           <p:cNvPr id="20" name="Picture 4" descr="MSc Cognitive Science Admission 2014-15, Indian Institute of Technology (IIT),  Gandhinagar">
             <a:extLst>
               <a:ext uri="{FF2B5EF4-FFF2-40B4-BE49-F238E27FC236}">
-                <a16:creationId xmlns:a16="http://schemas.microsoft.com/office/drawing/2014/main" xmlns="" id="{84C602A4-83A1-4E16-A980-2A9259BCC373}"/>
+                <a16:creationId xmlns="" xmlns:a16="http://schemas.microsoft.com/office/drawing/2014/main" id="{84C602A4-83A1-4E16-A980-2A9259BCC373}"/>
               </a:ext>
             </a:extLst>
           </p:cNvPr>
@@ -10040,7 +10116,7 @@
           <a:blip r:embed="rId3" cstate="print">
             <a:extLst>
               <a:ext uri="{28A0092B-C50C-407E-A947-70E740481C1C}">
-                <a14:useLocalDpi xmlns:a14="http://schemas.microsoft.com/office/drawing/2010/main" xmlns="" val="0"/>
+                <a14:useLocalDpi xmlns="" xmlns:a14="http://schemas.microsoft.com/office/drawing/2010/main" val="0"/>
               </a:ext>
             </a:extLst>
           </a:blip>
@@ -10060,7 +10136,7 @@
           <a:noFill/>
           <a:extLst>
             <a:ext uri="{909E8E84-426E-40DD-AFC4-6F175D3DCCD1}">
-              <a14:hiddenFill xmlns:a14="http://schemas.microsoft.com/office/drawing/2010/main" xmlns="">
+              <a14:hiddenFill xmlns="" xmlns:a14="http://schemas.microsoft.com/office/drawing/2010/main">
                 <a:solidFill>
                   <a:srgbClr val="FFFFFF"/>
                 </a:solidFill>
@@ -10164,7 +10240,7 @@
           <p:cNvPr id="6" name="Picture 5">
             <a:extLst>
               <a:ext uri="{FF2B5EF4-FFF2-40B4-BE49-F238E27FC236}">
-                <a16:creationId xmlns:a16="http://schemas.microsoft.com/office/drawing/2014/main" xmlns="" id="{8E0D68E5-C559-77A6-3B81-5313A0A961F2}"/>
+                <a16:creationId xmlns="" xmlns:a16="http://schemas.microsoft.com/office/drawing/2014/main" id="{8E0D68E5-C559-77A6-3B81-5313A0A961F2}"/>
               </a:ext>
             </a:extLst>
           </p:cNvPr>
@@ -10177,7 +10253,7 @@
           <a:blip r:embed="rId4" cstate="print">
             <a:extLst>
               <a:ext uri="{28A0092B-C50C-407E-A947-70E740481C1C}">
-                <a14:useLocalDpi xmlns:a14="http://schemas.microsoft.com/office/drawing/2010/main" xmlns="" val="0"/>
+                <a14:useLocalDpi xmlns="" xmlns:a14="http://schemas.microsoft.com/office/drawing/2010/main" val="0"/>
               </a:ext>
             </a:extLst>
           </a:blip>
@@ -10200,7 +10276,7 @@
           <p:cNvPr id="3" name="TextBox 2">
             <a:extLst>
               <a:ext uri="{FF2B5EF4-FFF2-40B4-BE49-F238E27FC236}">
-                <a16:creationId xmlns:a16="http://schemas.microsoft.com/office/drawing/2014/main" xmlns="" id="{BC7C9EB3-A270-C0F6-5363-26E308A37706}"/>
+                <a16:creationId xmlns="" xmlns:a16="http://schemas.microsoft.com/office/drawing/2014/main" id="{BC7C9EB3-A270-C0F6-5363-26E308A37706}"/>
               </a:ext>
             </a:extLst>
           </p:cNvPr>
@@ -10246,7 +10322,7 @@
           <p:cNvPr id="2" name="Table 3">
             <a:extLst>
               <a:ext uri="{FF2B5EF4-FFF2-40B4-BE49-F238E27FC236}">
-                <a16:creationId xmlns:a16="http://schemas.microsoft.com/office/drawing/2014/main" xmlns="" id="{7B154797-2D6E-0657-51A2-67D08813F457}"/>
+                <a16:creationId xmlns="" xmlns:a16="http://schemas.microsoft.com/office/drawing/2014/main" id="{7B154797-2D6E-0657-51A2-67D08813F457}"/>
               </a:ext>
             </a:extLst>
           </p:cNvPr>
@@ -10256,7 +10332,7 @@
           <p:nvPr>
             <p:extLst>
               <p:ext uri="{D42A27DB-BD31-4B8C-83A1-F6EECF244321}">
-                <p14:modId xmlns:p14="http://schemas.microsoft.com/office/powerpoint/2010/main" xmlns="" val="1813915914"/>
+                <p14:modId xmlns="" xmlns:p14="http://schemas.microsoft.com/office/powerpoint/2010/main" val="1813915914"/>
               </p:ext>
             </p:extLst>
           </p:nvPr>
@@ -10275,14 +10351,14 @@
                 <a:gridCol w="4114800">
                   <a:extLst>
                     <a:ext uri="{9D8B030D-6E8A-4147-A177-3AD203B41FA5}">
-                      <a16:colId xmlns:a16="http://schemas.microsoft.com/office/drawing/2014/main" xmlns="" val="110231139"/>
+                      <a16:colId xmlns="" xmlns:a16="http://schemas.microsoft.com/office/drawing/2014/main" val="110231139"/>
                     </a:ext>
                   </a:extLst>
                 </a:gridCol>
                 <a:gridCol w="3216676">
                   <a:extLst>
                     <a:ext uri="{9D8B030D-6E8A-4147-A177-3AD203B41FA5}">
-                      <a16:colId xmlns:a16="http://schemas.microsoft.com/office/drawing/2014/main" xmlns="" val="2699121428"/>
+                      <a16:colId xmlns="" xmlns:a16="http://schemas.microsoft.com/office/drawing/2014/main" val="2699121428"/>
                     </a:ext>
                   </a:extLst>
                 </a:gridCol>
@@ -10318,7 +10394,7 @@
                 </a:tc>
                 <a:extLst>
                   <a:ext uri="{0D108BD9-81ED-4DB2-BD59-A6C34878D82A}">
-                    <a16:rowId xmlns:a16="http://schemas.microsoft.com/office/drawing/2014/main" xmlns="" val="2931909680"/>
+                    <a16:rowId xmlns="" xmlns:a16="http://schemas.microsoft.com/office/drawing/2014/main" val="2931909680"/>
                   </a:ext>
                 </a:extLst>
               </a:tr>
@@ -10367,7 +10443,7 @@
                 </a:tc>
                 <a:extLst>
                   <a:ext uri="{0D108BD9-81ED-4DB2-BD59-A6C34878D82A}">
-                    <a16:rowId xmlns:a16="http://schemas.microsoft.com/office/drawing/2014/main" xmlns="" val="3527519372"/>
+                    <a16:rowId xmlns="" xmlns:a16="http://schemas.microsoft.com/office/drawing/2014/main" val="3527519372"/>
                   </a:ext>
                 </a:extLst>
               </a:tr>
@@ -10441,7 +10517,7 @@
                 </a:tc>
                 <a:extLst>
                   <a:ext uri="{0D108BD9-81ED-4DB2-BD59-A6C34878D82A}">
-                    <a16:rowId xmlns:a16="http://schemas.microsoft.com/office/drawing/2014/main" xmlns="" val="2000888641"/>
+                    <a16:rowId xmlns="" xmlns:a16="http://schemas.microsoft.com/office/drawing/2014/main" val="2000888641"/>
                   </a:ext>
                 </a:extLst>
               </a:tr>
@@ -10516,7 +10592,7 @@
                 </a:tc>
                 <a:extLst>
                   <a:ext uri="{0D108BD9-81ED-4DB2-BD59-A6C34878D82A}">
-                    <a16:rowId xmlns:a16="http://schemas.microsoft.com/office/drawing/2014/main" xmlns="" val="2700886337"/>
+                    <a16:rowId xmlns="" xmlns:a16="http://schemas.microsoft.com/office/drawing/2014/main" val="2700886337"/>
                   </a:ext>
                 </a:extLst>
               </a:tr>
@@ -10565,7 +10641,7 @@
                 </a:tc>
                 <a:extLst>
                   <a:ext uri="{0D108BD9-81ED-4DB2-BD59-A6C34878D82A}">
-                    <a16:rowId xmlns:a16="http://schemas.microsoft.com/office/drawing/2014/main" xmlns="" val="4085207208"/>
+                    <a16:rowId xmlns="" xmlns:a16="http://schemas.microsoft.com/office/drawing/2014/main" val="4085207208"/>
                   </a:ext>
                 </a:extLst>
               </a:tr>
@@ -10578,7 +10654,7 @@
           <p:cNvPr id="4" name="TextBox 3">
             <a:extLst>
               <a:ext uri="{FF2B5EF4-FFF2-40B4-BE49-F238E27FC236}">
-                <a16:creationId xmlns:a16="http://schemas.microsoft.com/office/drawing/2014/main" xmlns="" id="{CA943360-CCDB-A34A-1BAE-75E33B3EF69D}"/>
+                <a16:creationId xmlns="" xmlns:a16="http://schemas.microsoft.com/office/drawing/2014/main" id="{CA943360-CCDB-A34A-1BAE-75E33B3EF69D}"/>
               </a:ext>
             </a:extLst>
           </p:cNvPr>
@@ -10649,7 +10725,7 @@
     </p:spTree>
     <p:extLst>
       <p:ext uri="{BB962C8B-B14F-4D97-AF65-F5344CB8AC3E}">
-        <p14:creationId xmlns:p14="http://schemas.microsoft.com/office/powerpoint/2010/main" xmlns="" val="3945166475"/>
+        <p14:creationId xmlns="" xmlns:p14="http://schemas.microsoft.com/office/powerpoint/2010/main" val="3945166475"/>
       </p:ext>
     </p:extLst>
   </p:cSld>
@@ -10753,7 +10829,7 @@
           <p:cNvPr id="20" name="Picture 4" descr="MSc Cognitive Science Admission 2014-15, Indian Institute of Technology (IIT),  Gandhinagar">
             <a:extLst>
               <a:ext uri="{FF2B5EF4-FFF2-40B4-BE49-F238E27FC236}">
-                <a16:creationId xmlns:a16="http://schemas.microsoft.com/office/drawing/2014/main" xmlns="" id="{84C602A4-83A1-4E16-A980-2A9259BCC373}"/>
+                <a16:creationId xmlns="" xmlns:a16="http://schemas.microsoft.com/office/drawing/2014/main" id="{84C602A4-83A1-4E16-A980-2A9259BCC373}"/>
               </a:ext>
             </a:extLst>
           </p:cNvPr>
@@ -10766,7 +10842,7 @@
           <a:blip r:embed="rId3" cstate="print">
             <a:extLst>
               <a:ext uri="{28A0092B-C50C-407E-A947-70E740481C1C}">
-                <a14:useLocalDpi xmlns:a14="http://schemas.microsoft.com/office/drawing/2010/main" xmlns="" val="0"/>
+                <a14:useLocalDpi xmlns="" xmlns:a14="http://schemas.microsoft.com/office/drawing/2010/main" val="0"/>
               </a:ext>
             </a:extLst>
           </a:blip>
@@ -10786,7 +10862,7 @@
           <a:noFill/>
           <a:extLst>
             <a:ext uri="{909E8E84-426E-40DD-AFC4-6F175D3DCCD1}">
-              <a14:hiddenFill xmlns:a14="http://schemas.microsoft.com/office/drawing/2010/main" xmlns="">
+              <a14:hiddenFill xmlns="" xmlns:a14="http://schemas.microsoft.com/office/drawing/2010/main">
                 <a:solidFill>
                   <a:srgbClr val="FFFFFF"/>
                 </a:solidFill>
@@ -10890,7 +10966,7 @@
           <p:cNvPr id="6" name="Picture 5">
             <a:extLst>
               <a:ext uri="{FF2B5EF4-FFF2-40B4-BE49-F238E27FC236}">
-                <a16:creationId xmlns:a16="http://schemas.microsoft.com/office/drawing/2014/main" xmlns="" id="{8E0D68E5-C559-77A6-3B81-5313A0A961F2}"/>
+                <a16:creationId xmlns="" xmlns:a16="http://schemas.microsoft.com/office/drawing/2014/main" id="{8E0D68E5-C559-77A6-3B81-5313A0A961F2}"/>
               </a:ext>
             </a:extLst>
           </p:cNvPr>
@@ -10903,7 +10979,7 @@
           <a:blip r:embed="rId4" cstate="print">
             <a:extLst>
               <a:ext uri="{28A0092B-C50C-407E-A947-70E740481C1C}">
-                <a14:useLocalDpi xmlns:a14="http://schemas.microsoft.com/office/drawing/2010/main" xmlns="" val="0"/>
+                <a14:useLocalDpi xmlns="" xmlns:a14="http://schemas.microsoft.com/office/drawing/2010/main" val="0"/>
               </a:ext>
             </a:extLst>
           </a:blip>
@@ -10926,7 +11002,7 @@
           <p:cNvPr id="3" name="TextBox 2">
             <a:extLst>
               <a:ext uri="{FF2B5EF4-FFF2-40B4-BE49-F238E27FC236}">
-                <a16:creationId xmlns:a16="http://schemas.microsoft.com/office/drawing/2014/main" xmlns="" id="{BC7C9EB3-A270-C0F6-5363-26E308A37706}"/>
+                <a16:creationId xmlns="" xmlns:a16="http://schemas.microsoft.com/office/drawing/2014/main" id="{BC7C9EB3-A270-C0F6-5363-26E308A37706}"/>
               </a:ext>
             </a:extLst>
           </p:cNvPr>
@@ -10972,7 +11048,7 @@
           <p:cNvPr id="2" name="Table 3">
             <a:extLst>
               <a:ext uri="{FF2B5EF4-FFF2-40B4-BE49-F238E27FC236}">
-                <a16:creationId xmlns:a16="http://schemas.microsoft.com/office/drawing/2014/main" xmlns="" id="{7B154797-2D6E-0657-51A2-67D08813F457}"/>
+                <a16:creationId xmlns="" xmlns:a16="http://schemas.microsoft.com/office/drawing/2014/main" id="{7B154797-2D6E-0657-51A2-67D08813F457}"/>
               </a:ext>
             </a:extLst>
           </p:cNvPr>
@@ -10982,7 +11058,7 @@
           <p:nvPr>
             <p:extLst>
               <p:ext uri="{D42A27DB-BD31-4B8C-83A1-F6EECF244321}">
-                <p14:modId xmlns:p14="http://schemas.microsoft.com/office/powerpoint/2010/main" xmlns="" val="1813915914"/>
+                <p14:modId xmlns="" xmlns:p14="http://schemas.microsoft.com/office/powerpoint/2010/main" val="1813915914"/>
               </p:ext>
             </p:extLst>
           </p:nvPr>
@@ -11001,14 +11077,14 @@
                 <a:gridCol w="4114800">
                   <a:extLst>
                     <a:ext uri="{9D8B030D-6E8A-4147-A177-3AD203B41FA5}">
-                      <a16:colId xmlns:a16="http://schemas.microsoft.com/office/drawing/2014/main" xmlns="" val="110231139"/>
+                      <a16:colId xmlns="" xmlns:a16="http://schemas.microsoft.com/office/drawing/2014/main" val="110231139"/>
                     </a:ext>
                   </a:extLst>
                 </a:gridCol>
                 <a:gridCol w="3216676">
                   <a:extLst>
                     <a:ext uri="{9D8B030D-6E8A-4147-A177-3AD203B41FA5}">
-                      <a16:colId xmlns:a16="http://schemas.microsoft.com/office/drawing/2014/main" xmlns="" val="2699121428"/>
+                      <a16:colId xmlns="" xmlns:a16="http://schemas.microsoft.com/office/drawing/2014/main" val="2699121428"/>
                     </a:ext>
                   </a:extLst>
                 </a:gridCol>
@@ -11044,7 +11120,7 @@
                 </a:tc>
                 <a:extLst>
                   <a:ext uri="{0D108BD9-81ED-4DB2-BD59-A6C34878D82A}">
-                    <a16:rowId xmlns:a16="http://schemas.microsoft.com/office/drawing/2014/main" xmlns="" val="2931909680"/>
+                    <a16:rowId xmlns="" xmlns:a16="http://schemas.microsoft.com/office/drawing/2014/main" val="2931909680"/>
                   </a:ext>
                 </a:extLst>
               </a:tr>
@@ -11086,7 +11162,7 @@
                 </a:tc>
                 <a:extLst>
                   <a:ext uri="{0D108BD9-81ED-4DB2-BD59-A6C34878D82A}">
-                    <a16:rowId xmlns:a16="http://schemas.microsoft.com/office/drawing/2014/main" xmlns="" val="3527519372"/>
+                    <a16:rowId xmlns="" xmlns:a16="http://schemas.microsoft.com/office/drawing/2014/main" val="3527519372"/>
                   </a:ext>
                 </a:extLst>
               </a:tr>
@@ -11190,7 +11266,7 @@
                 </a:tc>
                 <a:extLst>
                   <a:ext uri="{0D108BD9-81ED-4DB2-BD59-A6C34878D82A}">
-                    <a16:rowId xmlns:a16="http://schemas.microsoft.com/office/drawing/2014/main" xmlns="" val="2000888641"/>
+                    <a16:rowId xmlns="" xmlns:a16="http://schemas.microsoft.com/office/drawing/2014/main" val="2000888641"/>
                   </a:ext>
                 </a:extLst>
               </a:tr>
@@ -11203,7 +11279,7 @@
           <p:cNvPr id="4" name="TextBox 3">
             <a:extLst>
               <a:ext uri="{FF2B5EF4-FFF2-40B4-BE49-F238E27FC236}">
-                <a16:creationId xmlns:a16="http://schemas.microsoft.com/office/drawing/2014/main" xmlns="" id="{CA943360-CCDB-A34A-1BAE-75E33B3EF69D}"/>
+                <a16:creationId xmlns="" xmlns:a16="http://schemas.microsoft.com/office/drawing/2014/main" id="{CA943360-CCDB-A34A-1BAE-75E33B3EF69D}"/>
               </a:ext>
             </a:extLst>
           </p:cNvPr>
@@ -11296,7 +11372,7 @@
     </p:spTree>
     <p:extLst>
       <p:ext uri="{BB962C8B-B14F-4D97-AF65-F5344CB8AC3E}">
-        <p14:creationId xmlns:p14="http://schemas.microsoft.com/office/powerpoint/2010/main" xmlns="" val="3945166475"/>
+        <p14:creationId xmlns="" xmlns:p14="http://schemas.microsoft.com/office/powerpoint/2010/main" val="3945166475"/>
       </p:ext>
     </p:extLst>
   </p:cSld>
@@ -11400,7 +11476,7 @@
           <p:cNvPr id="20" name="Picture 4" descr="MSc Cognitive Science Admission 2014-15, Indian Institute of Technology (IIT),  Gandhinagar">
             <a:extLst>
               <a:ext uri="{FF2B5EF4-FFF2-40B4-BE49-F238E27FC236}">
-                <a16:creationId xmlns:a16="http://schemas.microsoft.com/office/drawing/2014/main" xmlns="" id="{84C602A4-83A1-4E16-A980-2A9259BCC373}"/>
+                <a16:creationId xmlns="" xmlns:a16="http://schemas.microsoft.com/office/drawing/2014/main" id="{84C602A4-83A1-4E16-A980-2A9259BCC373}"/>
               </a:ext>
             </a:extLst>
           </p:cNvPr>
@@ -11413,7 +11489,7 @@
           <a:blip r:embed="rId3" cstate="print">
             <a:extLst>
               <a:ext uri="{28A0092B-C50C-407E-A947-70E740481C1C}">
-                <a14:useLocalDpi xmlns:a14="http://schemas.microsoft.com/office/drawing/2010/main" xmlns="" val="0"/>
+                <a14:useLocalDpi xmlns="" xmlns:a14="http://schemas.microsoft.com/office/drawing/2010/main" val="0"/>
               </a:ext>
             </a:extLst>
           </a:blip>
@@ -11433,7 +11509,7 @@
           <a:noFill/>
           <a:extLst>
             <a:ext uri="{909E8E84-426E-40DD-AFC4-6F175D3DCCD1}">
-              <a14:hiddenFill xmlns:a14="http://schemas.microsoft.com/office/drawing/2010/main" xmlns="">
+              <a14:hiddenFill xmlns="" xmlns:a14="http://schemas.microsoft.com/office/drawing/2010/main">
                 <a:solidFill>
                   <a:srgbClr val="FFFFFF"/>
                 </a:solidFill>
@@ -11537,7 +11613,7 @@
           <p:cNvPr id="6" name="Picture 5">
             <a:extLst>
               <a:ext uri="{FF2B5EF4-FFF2-40B4-BE49-F238E27FC236}">
-                <a16:creationId xmlns:a16="http://schemas.microsoft.com/office/drawing/2014/main" xmlns="" id="{8E0D68E5-C559-77A6-3B81-5313A0A961F2}"/>
+                <a16:creationId xmlns="" xmlns:a16="http://schemas.microsoft.com/office/drawing/2014/main" id="{8E0D68E5-C559-77A6-3B81-5313A0A961F2}"/>
               </a:ext>
             </a:extLst>
           </p:cNvPr>
@@ -11550,7 +11626,7 @@
           <a:blip r:embed="rId4" cstate="print">
             <a:extLst>
               <a:ext uri="{28A0092B-C50C-407E-A947-70E740481C1C}">
-                <a14:useLocalDpi xmlns:a14="http://schemas.microsoft.com/office/drawing/2010/main" xmlns="" val="0"/>
+                <a14:useLocalDpi xmlns="" xmlns:a14="http://schemas.microsoft.com/office/drawing/2010/main" val="0"/>
               </a:ext>
             </a:extLst>
           </a:blip>
@@ -11573,7 +11649,7 @@
           <p:cNvPr id="4" name="TextBox 3">
             <a:extLst>
               <a:ext uri="{FF2B5EF4-FFF2-40B4-BE49-F238E27FC236}">
-                <a16:creationId xmlns:a16="http://schemas.microsoft.com/office/drawing/2014/main" xmlns="" id="{CA943360-CCDB-A34A-1BAE-75E33B3EF69D}"/>
+                <a16:creationId xmlns="" xmlns:a16="http://schemas.microsoft.com/office/drawing/2014/main" id="{CA943360-CCDB-A34A-1BAE-75E33B3EF69D}"/>
               </a:ext>
             </a:extLst>
           </p:cNvPr>
@@ -11731,7 +11807,7 @@
     </p:spTree>
     <p:extLst>
       <p:ext uri="{BB962C8B-B14F-4D97-AF65-F5344CB8AC3E}">
-        <p14:creationId xmlns:p14="http://schemas.microsoft.com/office/powerpoint/2010/main" xmlns="" val="3945166475"/>
+        <p14:creationId xmlns="" xmlns:p14="http://schemas.microsoft.com/office/powerpoint/2010/main" val="3945166475"/>
       </p:ext>
     </p:extLst>
   </p:cSld>
@@ -11835,7 +11911,7 @@
           <p:cNvPr id="20" name="Picture 4" descr="MSc Cognitive Science Admission 2014-15, Indian Institute of Technology (IIT),  Gandhinagar">
             <a:extLst>
               <a:ext uri="{FF2B5EF4-FFF2-40B4-BE49-F238E27FC236}">
-                <a16:creationId xmlns:a16="http://schemas.microsoft.com/office/drawing/2014/main" xmlns="" id="{84C602A4-83A1-4E16-A980-2A9259BCC373}"/>
+                <a16:creationId xmlns="" xmlns:a16="http://schemas.microsoft.com/office/drawing/2014/main" id="{84C602A4-83A1-4E16-A980-2A9259BCC373}"/>
               </a:ext>
             </a:extLst>
           </p:cNvPr>
@@ -11848,7 +11924,7 @@
           <a:blip r:embed="rId3" cstate="print">
             <a:extLst>
               <a:ext uri="{28A0092B-C50C-407E-A947-70E740481C1C}">
-                <a14:useLocalDpi xmlns:a14="http://schemas.microsoft.com/office/drawing/2010/main" xmlns="" val="0"/>
+                <a14:useLocalDpi xmlns="" xmlns:a14="http://schemas.microsoft.com/office/drawing/2010/main" val="0"/>
               </a:ext>
             </a:extLst>
           </a:blip>
@@ -11868,7 +11944,7 @@
           <a:noFill/>
           <a:extLst>
             <a:ext uri="{909E8E84-426E-40DD-AFC4-6F175D3DCCD1}">
-              <a14:hiddenFill xmlns:a14="http://schemas.microsoft.com/office/drawing/2010/main" xmlns="">
+              <a14:hiddenFill xmlns="" xmlns:a14="http://schemas.microsoft.com/office/drawing/2010/main">
                 <a:solidFill>
                   <a:srgbClr val="FFFFFF"/>
                 </a:solidFill>
@@ -11972,7 +12048,7 @@
           <p:cNvPr id="6" name="Picture 5">
             <a:extLst>
               <a:ext uri="{FF2B5EF4-FFF2-40B4-BE49-F238E27FC236}">
-                <a16:creationId xmlns:a16="http://schemas.microsoft.com/office/drawing/2014/main" xmlns="" id="{8E0D68E5-C559-77A6-3B81-5313A0A961F2}"/>
+                <a16:creationId xmlns="" xmlns:a16="http://schemas.microsoft.com/office/drawing/2014/main" id="{8E0D68E5-C559-77A6-3B81-5313A0A961F2}"/>
               </a:ext>
             </a:extLst>
           </p:cNvPr>
@@ -11985,7 +12061,7 @@
           <a:blip r:embed="rId4" cstate="print">
             <a:extLst>
               <a:ext uri="{28A0092B-C50C-407E-A947-70E740481C1C}">
-                <a14:useLocalDpi xmlns:a14="http://schemas.microsoft.com/office/drawing/2010/main" xmlns="" val="0"/>
+                <a14:useLocalDpi xmlns="" xmlns:a14="http://schemas.microsoft.com/office/drawing/2010/main" val="0"/>
               </a:ext>
             </a:extLst>
           </a:blip>
@@ -12008,7 +12084,7 @@
           <p:cNvPr id="3" name="TextBox 2">
             <a:extLst>
               <a:ext uri="{FF2B5EF4-FFF2-40B4-BE49-F238E27FC236}">
-                <a16:creationId xmlns:a16="http://schemas.microsoft.com/office/drawing/2014/main" xmlns="" id="{BC7C9EB3-A270-C0F6-5363-26E308A37706}"/>
+                <a16:creationId xmlns="" xmlns:a16="http://schemas.microsoft.com/office/drawing/2014/main" id="{BC7C9EB3-A270-C0F6-5363-26E308A37706}"/>
               </a:ext>
             </a:extLst>
           </p:cNvPr>
@@ -12054,7 +12130,7 @@
           <p:cNvPr id="2" name="Table 3">
             <a:extLst>
               <a:ext uri="{FF2B5EF4-FFF2-40B4-BE49-F238E27FC236}">
-                <a16:creationId xmlns:a16="http://schemas.microsoft.com/office/drawing/2014/main" xmlns="" id="{7B154797-2D6E-0657-51A2-67D08813F457}"/>
+                <a16:creationId xmlns="" xmlns:a16="http://schemas.microsoft.com/office/drawing/2014/main" id="{7B154797-2D6E-0657-51A2-67D08813F457}"/>
               </a:ext>
             </a:extLst>
           </p:cNvPr>
@@ -12064,7 +12140,7 @@
           <p:nvPr>
             <p:extLst>
               <p:ext uri="{D42A27DB-BD31-4B8C-83A1-F6EECF244321}">
-                <p14:modId xmlns:p14="http://schemas.microsoft.com/office/powerpoint/2010/main" xmlns="" val="1813915914"/>
+                <p14:modId xmlns="" xmlns:p14="http://schemas.microsoft.com/office/powerpoint/2010/main" val="1813915914"/>
               </p:ext>
             </p:extLst>
           </p:nvPr>
@@ -12083,14 +12159,14 @@
                 <a:gridCol w="5286375">
                   <a:extLst>
                     <a:ext uri="{9D8B030D-6E8A-4147-A177-3AD203B41FA5}">
-                      <a16:colId xmlns:a16="http://schemas.microsoft.com/office/drawing/2014/main" xmlns="" val="110231139"/>
+                      <a16:colId xmlns="" xmlns:a16="http://schemas.microsoft.com/office/drawing/2014/main" val="110231139"/>
                     </a:ext>
                   </a:extLst>
                 </a:gridCol>
                 <a:gridCol w="2714625">
                   <a:extLst>
                     <a:ext uri="{9D8B030D-6E8A-4147-A177-3AD203B41FA5}">
-                      <a16:colId xmlns:a16="http://schemas.microsoft.com/office/drawing/2014/main" xmlns="" val="2699121428"/>
+                      <a16:colId xmlns="" xmlns:a16="http://schemas.microsoft.com/office/drawing/2014/main" val="2699121428"/>
                     </a:ext>
                   </a:extLst>
                 </a:gridCol>
@@ -12126,7 +12202,7 @@
                 </a:tc>
                 <a:extLst>
                   <a:ext uri="{0D108BD9-81ED-4DB2-BD59-A6C34878D82A}">
-                    <a16:rowId xmlns:a16="http://schemas.microsoft.com/office/drawing/2014/main" xmlns="" val="2931909680"/>
+                    <a16:rowId xmlns="" xmlns:a16="http://schemas.microsoft.com/office/drawing/2014/main" val="2931909680"/>
                   </a:ext>
                 </a:extLst>
               </a:tr>
@@ -12166,7 +12242,7 @@
                 </a:tc>
                 <a:extLst>
                   <a:ext uri="{0D108BD9-81ED-4DB2-BD59-A6C34878D82A}">
-                    <a16:rowId xmlns:a16="http://schemas.microsoft.com/office/drawing/2014/main" xmlns="" val="3527519372"/>
+                    <a16:rowId xmlns="" xmlns:a16="http://schemas.microsoft.com/office/drawing/2014/main" val="3527519372"/>
                   </a:ext>
                 </a:extLst>
               </a:tr>
@@ -12202,7 +12278,7 @@
                 </a:tc>
                 <a:extLst>
                   <a:ext uri="{0D108BD9-81ED-4DB2-BD59-A6C34878D82A}">
-                    <a16:rowId xmlns:a16="http://schemas.microsoft.com/office/drawing/2014/main" xmlns="" val="2000888641"/>
+                    <a16:rowId xmlns="" xmlns:a16="http://schemas.microsoft.com/office/drawing/2014/main" val="2000888641"/>
                   </a:ext>
                 </a:extLst>
               </a:tr>
@@ -12238,7 +12314,7 @@
                 </a:tc>
                 <a:extLst>
                   <a:ext uri="{0D108BD9-81ED-4DB2-BD59-A6C34878D82A}">
-                    <a16:rowId xmlns:a16="http://schemas.microsoft.com/office/drawing/2014/main" xmlns="" val="2700886337"/>
+                    <a16:rowId xmlns="" xmlns:a16="http://schemas.microsoft.com/office/drawing/2014/main" val="2700886337"/>
                   </a:ext>
                 </a:extLst>
               </a:tr>
@@ -12274,7 +12350,7 @@
                 </a:tc>
                 <a:extLst>
                   <a:ext uri="{0D108BD9-81ED-4DB2-BD59-A6C34878D82A}">
-                    <a16:rowId xmlns:a16="http://schemas.microsoft.com/office/drawing/2014/main" xmlns="" val="4085207208"/>
+                    <a16:rowId xmlns="" xmlns:a16="http://schemas.microsoft.com/office/drawing/2014/main" val="4085207208"/>
                   </a:ext>
                 </a:extLst>
               </a:tr>
@@ -12322,7 +12398,7 @@
           <p:cNvPr id="4" name="TextBox 3">
             <a:extLst>
               <a:ext uri="{FF2B5EF4-FFF2-40B4-BE49-F238E27FC236}">
-                <a16:creationId xmlns:a16="http://schemas.microsoft.com/office/drawing/2014/main" xmlns="" id="{CA943360-CCDB-A34A-1BAE-75E33B3EF69D}"/>
+                <a16:creationId xmlns="" xmlns:a16="http://schemas.microsoft.com/office/drawing/2014/main" id="{CA943360-CCDB-A34A-1BAE-75E33B3EF69D}"/>
               </a:ext>
             </a:extLst>
           </p:cNvPr>
@@ -12392,7 +12468,7 @@
     </p:spTree>
     <p:extLst>
       <p:ext uri="{BB962C8B-B14F-4D97-AF65-F5344CB8AC3E}">
-        <p14:creationId xmlns:p14="http://schemas.microsoft.com/office/powerpoint/2010/main" xmlns="" val="3945166475"/>
+        <p14:creationId xmlns="" xmlns:p14="http://schemas.microsoft.com/office/powerpoint/2010/main" val="3945166475"/>
       </p:ext>
     </p:extLst>
   </p:cSld>
@@ -12496,7 +12572,7 @@
           <p:cNvPr id="20" name="Picture 4" descr="MSc Cognitive Science Admission 2014-15, Indian Institute of Technology (IIT),  Gandhinagar">
             <a:extLst>
               <a:ext uri="{FF2B5EF4-FFF2-40B4-BE49-F238E27FC236}">
-                <a16:creationId xmlns:a16="http://schemas.microsoft.com/office/drawing/2014/main" xmlns="" id="{84C602A4-83A1-4E16-A980-2A9259BCC373}"/>
+                <a16:creationId xmlns="" xmlns:a16="http://schemas.microsoft.com/office/drawing/2014/main" id="{84C602A4-83A1-4E16-A980-2A9259BCC373}"/>
               </a:ext>
             </a:extLst>
           </p:cNvPr>
@@ -12509,7 +12585,7 @@
           <a:blip r:embed="rId3" cstate="print">
             <a:extLst>
               <a:ext uri="{28A0092B-C50C-407E-A947-70E740481C1C}">
-                <a14:useLocalDpi xmlns:a14="http://schemas.microsoft.com/office/drawing/2010/main" xmlns="" val="0"/>
+                <a14:useLocalDpi xmlns="" xmlns:a14="http://schemas.microsoft.com/office/drawing/2010/main" val="0"/>
               </a:ext>
             </a:extLst>
           </a:blip>
@@ -12529,7 +12605,7 @@
           <a:noFill/>
           <a:extLst>
             <a:ext uri="{909E8E84-426E-40DD-AFC4-6F175D3DCCD1}">
-              <a14:hiddenFill xmlns:a14="http://schemas.microsoft.com/office/drawing/2010/main" xmlns="">
+              <a14:hiddenFill xmlns="" xmlns:a14="http://schemas.microsoft.com/office/drawing/2010/main">
                 <a:solidFill>
                   <a:srgbClr val="FFFFFF"/>
                 </a:solidFill>
@@ -12633,7 +12709,7 @@
           <p:cNvPr id="6" name="Picture 5">
             <a:extLst>
               <a:ext uri="{FF2B5EF4-FFF2-40B4-BE49-F238E27FC236}">
-                <a16:creationId xmlns:a16="http://schemas.microsoft.com/office/drawing/2014/main" xmlns="" id="{8E0D68E5-C559-77A6-3B81-5313A0A961F2}"/>
+                <a16:creationId xmlns="" xmlns:a16="http://schemas.microsoft.com/office/drawing/2014/main" id="{8E0D68E5-C559-77A6-3B81-5313A0A961F2}"/>
               </a:ext>
             </a:extLst>
           </p:cNvPr>
@@ -12646,7 +12722,7 @@
           <a:blip r:embed="rId4" cstate="print">
             <a:extLst>
               <a:ext uri="{28A0092B-C50C-407E-A947-70E740481C1C}">
-                <a14:useLocalDpi xmlns:a14="http://schemas.microsoft.com/office/drawing/2010/main" xmlns="" val="0"/>
+                <a14:useLocalDpi xmlns="" xmlns:a14="http://schemas.microsoft.com/office/drawing/2010/main" val="0"/>
               </a:ext>
             </a:extLst>
           </a:blip>
@@ -12669,7 +12745,7 @@
           <p:cNvPr id="2" name="Table 3">
             <a:extLst>
               <a:ext uri="{FF2B5EF4-FFF2-40B4-BE49-F238E27FC236}">
-                <a16:creationId xmlns:a16="http://schemas.microsoft.com/office/drawing/2014/main" xmlns="" id="{7B154797-2D6E-0657-51A2-67D08813F457}"/>
+                <a16:creationId xmlns="" xmlns:a16="http://schemas.microsoft.com/office/drawing/2014/main" id="{7B154797-2D6E-0657-51A2-67D08813F457}"/>
               </a:ext>
             </a:extLst>
           </p:cNvPr>
@@ -12679,7 +12755,7 @@
           <p:nvPr>
             <p:extLst>
               <p:ext uri="{D42A27DB-BD31-4B8C-83A1-F6EECF244321}">
-                <p14:modId xmlns:p14="http://schemas.microsoft.com/office/powerpoint/2010/main" xmlns="" val="1813915914"/>
+                <p14:modId xmlns="" xmlns:p14="http://schemas.microsoft.com/office/powerpoint/2010/main" val="1813915914"/>
               </p:ext>
             </p:extLst>
           </p:nvPr>
@@ -12699,14 +12775,14 @@
                 <a:gridCol w="5832988">
                   <a:extLst>
                     <a:ext uri="{9D8B030D-6E8A-4147-A177-3AD203B41FA5}">
-                      <a16:colId xmlns:a16="http://schemas.microsoft.com/office/drawing/2014/main" xmlns="" val="110231139"/>
+                      <a16:colId xmlns="" xmlns:a16="http://schemas.microsoft.com/office/drawing/2014/main" val="110231139"/>
                     </a:ext>
                   </a:extLst>
                 </a:gridCol>
                 <a:gridCol w="1634613">
                   <a:extLst>
                     <a:ext uri="{9D8B030D-6E8A-4147-A177-3AD203B41FA5}">
-                      <a16:colId xmlns:a16="http://schemas.microsoft.com/office/drawing/2014/main" xmlns="" val="2699121428"/>
+                      <a16:colId xmlns="" xmlns:a16="http://schemas.microsoft.com/office/drawing/2014/main" val="2699121428"/>
                     </a:ext>
                   </a:extLst>
                 </a:gridCol>
@@ -12753,7 +12829,7 @@
                 </a:tc>
                 <a:extLst>
                   <a:ext uri="{0D108BD9-81ED-4DB2-BD59-A6C34878D82A}">
-                    <a16:rowId xmlns:a16="http://schemas.microsoft.com/office/drawing/2014/main" xmlns="" val="2931909680"/>
+                    <a16:rowId xmlns="" xmlns:a16="http://schemas.microsoft.com/office/drawing/2014/main" val="2931909680"/>
                   </a:ext>
                 </a:extLst>
               </a:tr>
@@ -12804,7 +12880,7 @@
                 </a:tc>
                 <a:extLst>
                   <a:ext uri="{0D108BD9-81ED-4DB2-BD59-A6C34878D82A}">
-                    <a16:rowId xmlns:a16="http://schemas.microsoft.com/office/drawing/2014/main" xmlns="" val="3527519372"/>
+                    <a16:rowId xmlns="" xmlns:a16="http://schemas.microsoft.com/office/drawing/2014/main" val="3527519372"/>
                   </a:ext>
                 </a:extLst>
               </a:tr>
@@ -12860,7 +12936,7 @@
                 </a:tc>
                 <a:extLst>
                   <a:ext uri="{0D108BD9-81ED-4DB2-BD59-A6C34878D82A}">
-                    <a16:rowId xmlns:a16="http://schemas.microsoft.com/office/drawing/2014/main" xmlns="" val="2000888641"/>
+                    <a16:rowId xmlns="" xmlns:a16="http://schemas.microsoft.com/office/drawing/2014/main" val="2000888641"/>
                   </a:ext>
                 </a:extLst>
               </a:tr>
@@ -12915,7 +12991,7 @@
                 </a:tc>
                 <a:extLst>
                   <a:ext uri="{0D108BD9-81ED-4DB2-BD59-A6C34878D82A}">
-                    <a16:rowId xmlns:a16="http://schemas.microsoft.com/office/drawing/2014/main" xmlns="" val="2700886337"/>
+                    <a16:rowId xmlns="" xmlns:a16="http://schemas.microsoft.com/office/drawing/2014/main" val="2700886337"/>
                   </a:ext>
                 </a:extLst>
               </a:tr>
@@ -12970,7 +13046,7 @@
                 </a:tc>
                 <a:extLst>
                   <a:ext uri="{0D108BD9-81ED-4DB2-BD59-A6C34878D82A}">
-                    <a16:rowId xmlns:a16="http://schemas.microsoft.com/office/drawing/2014/main" xmlns="" val="4085207208"/>
+                    <a16:rowId xmlns="" xmlns:a16="http://schemas.microsoft.com/office/drawing/2014/main" val="4085207208"/>
                   </a:ext>
                 </a:extLst>
               </a:tr>
@@ -13416,7 +13492,7 @@
           <p:cNvPr id="4" name="TextBox 3">
             <a:extLst>
               <a:ext uri="{FF2B5EF4-FFF2-40B4-BE49-F238E27FC236}">
-                <a16:creationId xmlns:a16="http://schemas.microsoft.com/office/drawing/2014/main" xmlns="" id="{CA943360-CCDB-A34A-1BAE-75E33B3EF69D}"/>
+                <a16:creationId xmlns="" xmlns:a16="http://schemas.microsoft.com/office/drawing/2014/main" id="{CA943360-CCDB-A34A-1BAE-75E33B3EF69D}"/>
               </a:ext>
             </a:extLst>
           </p:cNvPr>
@@ -13459,9 +13535,8 @@
                 <a:solidFill>
                   <a:srgbClr val="222222"/>
                 </a:solidFill>
-                <a:effectLst/>
               </a:rPr>
-              <a:t>4</a:t>
+              <a:t>3</a:t>
             </a:r>
             <a:endParaRPr lang="en-US" sz="1600" b="1" dirty="0">
               <a:solidFill>
@@ -13475,7 +13550,7 @@
     </p:spTree>
     <p:extLst>
       <p:ext uri="{BB962C8B-B14F-4D97-AF65-F5344CB8AC3E}">
-        <p14:creationId xmlns:p14="http://schemas.microsoft.com/office/powerpoint/2010/main" xmlns="" val="3945166475"/>
+        <p14:creationId xmlns="" xmlns:p14="http://schemas.microsoft.com/office/powerpoint/2010/main" val="3945166475"/>
       </p:ext>
     </p:extLst>
   </p:cSld>
@@ -13579,7 +13654,7 @@
           <p:cNvPr id="20" name="Picture 4" descr="MSc Cognitive Science Admission 2014-15, Indian Institute of Technology (IIT),  Gandhinagar">
             <a:extLst>
               <a:ext uri="{FF2B5EF4-FFF2-40B4-BE49-F238E27FC236}">
-                <a16:creationId xmlns:a16="http://schemas.microsoft.com/office/drawing/2014/main" xmlns="" id="{84C602A4-83A1-4E16-A980-2A9259BCC373}"/>
+                <a16:creationId xmlns="" xmlns:a16="http://schemas.microsoft.com/office/drawing/2014/main" id="{84C602A4-83A1-4E16-A980-2A9259BCC373}"/>
               </a:ext>
             </a:extLst>
           </p:cNvPr>
@@ -13592,7 +13667,7 @@
           <a:blip r:embed="rId3" cstate="print">
             <a:extLst>
               <a:ext uri="{28A0092B-C50C-407E-A947-70E740481C1C}">
-                <a14:useLocalDpi xmlns:a14="http://schemas.microsoft.com/office/drawing/2010/main" xmlns="" val="0"/>
+                <a14:useLocalDpi xmlns="" xmlns:a14="http://schemas.microsoft.com/office/drawing/2010/main" val="0"/>
               </a:ext>
             </a:extLst>
           </a:blip>
@@ -13612,7 +13687,7 @@
           <a:noFill/>
           <a:extLst>
             <a:ext uri="{909E8E84-426E-40DD-AFC4-6F175D3DCCD1}">
-              <a14:hiddenFill xmlns:a14="http://schemas.microsoft.com/office/drawing/2010/main" xmlns="">
+              <a14:hiddenFill xmlns="" xmlns:a14="http://schemas.microsoft.com/office/drawing/2010/main">
                 <a:solidFill>
                   <a:srgbClr val="FFFFFF"/>
                 </a:solidFill>
@@ -13716,7 +13791,7 @@
           <p:cNvPr id="6" name="Picture 5">
             <a:extLst>
               <a:ext uri="{FF2B5EF4-FFF2-40B4-BE49-F238E27FC236}">
-                <a16:creationId xmlns:a16="http://schemas.microsoft.com/office/drawing/2014/main" xmlns="" id="{8E0D68E5-C559-77A6-3B81-5313A0A961F2}"/>
+                <a16:creationId xmlns="" xmlns:a16="http://schemas.microsoft.com/office/drawing/2014/main" id="{8E0D68E5-C559-77A6-3B81-5313A0A961F2}"/>
               </a:ext>
             </a:extLst>
           </p:cNvPr>
@@ -13729,7 +13804,7 @@
           <a:blip r:embed="rId4" cstate="print">
             <a:extLst>
               <a:ext uri="{28A0092B-C50C-407E-A947-70E740481C1C}">
-                <a14:useLocalDpi xmlns:a14="http://schemas.microsoft.com/office/drawing/2010/main" xmlns="" val="0"/>
+                <a14:useLocalDpi xmlns="" xmlns:a14="http://schemas.microsoft.com/office/drawing/2010/main" val="0"/>
               </a:ext>
             </a:extLst>
           </a:blip>
@@ -13752,7 +13827,7 @@
           <p:cNvPr id="2" name="Table 3">
             <a:extLst>
               <a:ext uri="{FF2B5EF4-FFF2-40B4-BE49-F238E27FC236}">
-                <a16:creationId xmlns:a16="http://schemas.microsoft.com/office/drawing/2014/main" xmlns="" id="{7B154797-2D6E-0657-51A2-67D08813F457}"/>
+                <a16:creationId xmlns="" xmlns:a16="http://schemas.microsoft.com/office/drawing/2014/main" id="{7B154797-2D6E-0657-51A2-67D08813F457}"/>
               </a:ext>
             </a:extLst>
           </p:cNvPr>
@@ -13762,7 +13837,7 @@
           <p:nvPr>
             <p:extLst>
               <p:ext uri="{D42A27DB-BD31-4B8C-83A1-F6EECF244321}">
-                <p14:modId xmlns:p14="http://schemas.microsoft.com/office/powerpoint/2010/main" xmlns="" val="1813915914"/>
+                <p14:modId xmlns="" xmlns:p14="http://schemas.microsoft.com/office/powerpoint/2010/main" val="1813915914"/>
               </p:ext>
             </p:extLst>
           </p:nvPr>
@@ -13782,14 +13857,14 @@
                 <a:gridCol w="5832988">
                   <a:extLst>
                     <a:ext uri="{9D8B030D-6E8A-4147-A177-3AD203B41FA5}">
-                      <a16:colId xmlns:a16="http://schemas.microsoft.com/office/drawing/2014/main" xmlns="" val="110231139"/>
+                      <a16:colId xmlns="" xmlns:a16="http://schemas.microsoft.com/office/drawing/2014/main" val="110231139"/>
                     </a:ext>
                   </a:extLst>
                 </a:gridCol>
                 <a:gridCol w="1634613">
                   <a:extLst>
                     <a:ext uri="{9D8B030D-6E8A-4147-A177-3AD203B41FA5}">
-                      <a16:colId xmlns:a16="http://schemas.microsoft.com/office/drawing/2014/main" xmlns="" val="2699121428"/>
+                      <a16:colId xmlns="" xmlns:a16="http://schemas.microsoft.com/office/drawing/2014/main" val="2699121428"/>
                     </a:ext>
                   </a:extLst>
                 </a:gridCol>
@@ -13836,7 +13911,7 @@
                 </a:tc>
                 <a:extLst>
                   <a:ext uri="{0D108BD9-81ED-4DB2-BD59-A6C34878D82A}">
-                    <a16:rowId xmlns:a16="http://schemas.microsoft.com/office/drawing/2014/main" xmlns="" val="2931909680"/>
+                    <a16:rowId xmlns="" xmlns:a16="http://schemas.microsoft.com/office/drawing/2014/main" val="2931909680"/>
                   </a:ext>
                 </a:extLst>
               </a:tr>
@@ -14313,7 +14388,7 @@
           <p:cNvPr id="4" name="TextBox 3">
             <a:extLst>
               <a:ext uri="{FF2B5EF4-FFF2-40B4-BE49-F238E27FC236}">
-                <a16:creationId xmlns:a16="http://schemas.microsoft.com/office/drawing/2014/main" xmlns="" id="{CA943360-CCDB-A34A-1BAE-75E33B3EF69D}"/>
+                <a16:creationId xmlns="" xmlns:a16="http://schemas.microsoft.com/office/drawing/2014/main" id="{CA943360-CCDB-A34A-1BAE-75E33B3EF69D}"/>
               </a:ext>
             </a:extLst>
           </p:cNvPr>
@@ -14371,7 +14446,7 @@
     </p:spTree>
     <p:extLst>
       <p:ext uri="{BB962C8B-B14F-4D97-AF65-F5344CB8AC3E}">
-        <p14:creationId xmlns:p14="http://schemas.microsoft.com/office/powerpoint/2010/main" xmlns="" val="3945166475"/>
+        <p14:creationId xmlns="" xmlns:p14="http://schemas.microsoft.com/office/powerpoint/2010/main" val="3945166475"/>
       </p:ext>
     </p:extLst>
   </p:cSld>
@@ -14475,7 +14550,7 @@
           <p:cNvPr id="20" name="Picture 4" descr="MSc Cognitive Science Admission 2014-15, Indian Institute of Technology (IIT),  Gandhinagar">
             <a:extLst>
               <a:ext uri="{FF2B5EF4-FFF2-40B4-BE49-F238E27FC236}">
-                <a16:creationId xmlns:a16="http://schemas.microsoft.com/office/drawing/2014/main" xmlns="" id="{84C602A4-83A1-4E16-A980-2A9259BCC373}"/>
+                <a16:creationId xmlns="" xmlns:a16="http://schemas.microsoft.com/office/drawing/2014/main" id="{84C602A4-83A1-4E16-A980-2A9259BCC373}"/>
               </a:ext>
             </a:extLst>
           </p:cNvPr>
@@ -14488,7 +14563,7 @@
           <a:blip r:embed="rId3" cstate="print">
             <a:extLst>
               <a:ext uri="{28A0092B-C50C-407E-A947-70E740481C1C}">
-                <a14:useLocalDpi xmlns:a14="http://schemas.microsoft.com/office/drawing/2010/main" xmlns="" val="0"/>
+                <a14:useLocalDpi xmlns="" xmlns:a14="http://schemas.microsoft.com/office/drawing/2010/main" val="0"/>
               </a:ext>
             </a:extLst>
           </a:blip>
@@ -14508,7 +14583,7 @@
           <a:noFill/>
           <a:extLst>
             <a:ext uri="{909E8E84-426E-40DD-AFC4-6F175D3DCCD1}">
-              <a14:hiddenFill xmlns:a14="http://schemas.microsoft.com/office/drawing/2010/main" xmlns="">
+              <a14:hiddenFill xmlns="" xmlns:a14="http://schemas.microsoft.com/office/drawing/2010/main">
                 <a:solidFill>
                   <a:srgbClr val="FFFFFF"/>
                 </a:solidFill>
@@ -14612,7 +14687,7 @@
           <p:cNvPr id="6" name="Picture 5">
             <a:extLst>
               <a:ext uri="{FF2B5EF4-FFF2-40B4-BE49-F238E27FC236}">
-                <a16:creationId xmlns:a16="http://schemas.microsoft.com/office/drawing/2014/main" xmlns="" id="{8E0D68E5-C559-77A6-3B81-5313A0A961F2}"/>
+                <a16:creationId xmlns="" xmlns:a16="http://schemas.microsoft.com/office/drawing/2014/main" id="{8E0D68E5-C559-77A6-3B81-5313A0A961F2}"/>
               </a:ext>
             </a:extLst>
           </p:cNvPr>
@@ -14625,7 +14700,7 @@
           <a:blip r:embed="rId4" cstate="print">
             <a:extLst>
               <a:ext uri="{28A0092B-C50C-407E-A947-70E740481C1C}">
-                <a14:useLocalDpi xmlns:a14="http://schemas.microsoft.com/office/drawing/2010/main" xmlns="" val="0"/>
+                <a14:useLocalDpi xmlns="" xmlns:a14="http://schemas.microsoft.com/office/drawing/2010/main" val="0"/>
               </a:ext>
             </a:extLst>
           </a:blip>
@@ -14648,7 +14723,7 @@
           <p:cNvPr id="3" name="TextBox 2">
             <a:extLst>
               <a:ext uri="{FF2B5EF4-FFF2-40B4-BE49-F238E27FC236}">
-                <a16:creationId xmlns:a16="http://schemas.microsoft.com/office/drawing/2014/main" xmlns="" id="{BC7C9EB3-A270-C0F6-5363-26E308A37706}"/>
+                <a16:creationId xmlns="" xmlns:a16="http://schemas.microsoft.com/office/drawing/2014/main" id="{BC7C9EB3-A270-C0F6-5363-26E308A37706}"/>
               </a:ext>
             </a:extLst>
           </p:cNvPr>
@@ -14694,7 +14769,7 @@
           <p:cNvPr id="2" name="Table 3">
             <a:extLst>
               <a:ext uri="{FF2B5EF4-FFF2-40B4-BE49-F238E27FC236}">
-                <a16:creationId xmlns:a16="http://schemas.microsoft.com/office/drawing/2014/main" xmlns="" id="{7B154797-2D6E-0657-51A2-67D08813F457}"/>
+                <a16:creationId xmlns="" xmlns:a16="http://schemas.microsoft.com/office/drawing/2014/main" id="{7B154797-2D6E-0657-51A2-67D08813F457}"/>
               </a:ext>
             </a:extLst>
           </p:cNvPr>
@@ -14704,7 +14779,7 @@
           <p:nvPr>
             <p:extLst>
               <p:ext uri="{D42A27DB-BD31-4B8C-83A1-F6EECF244321}">
-                <p14:modId xmlns:p14="http://schemas.microsoft.com/office/powerpoint/2010/main" xmlns="" val="1813915914"/>
+                <p14:modId xmlns="" xmlns:p14="http://schemas.microsoft.com/office/powerpoint/2010/main" val="1813915914"/>
               </p:ext>
             </p:extLst>
           </p:nvPr>
@@ -14723,14 +14798,14 @@
                 <a:gridCol w="4114800">
                   <a:extLst>
                     <a:ext uri="{9D8B030D-6E8A-4147-A177-3AD203B41FA5}">
-                      <a16:colId xmlns:a16="http://schemas.microsoft.com/office/drawing/2014/main" xmlns="" val="110231139"/>
+                      <a16:colId xmlns="" xmlns:a16="http://schemas.microsoft.com/office/drawing/2014/main" val="110231139"/>
                     </a:ext>
                   </a:extLst>
                 </a:gridCol>
                 <a:gridCol w="3216676">
                   <a:extLst>
                     <a:ext uri="{9D8B030D-6E8A-4147-A177-3AD203B41FA5}">
-                      <a16:colId xmlns:a16="http://schemas.microsoft.com/office/drawing/2014/main" xmlns="" val="2699121428"/>
+                      <a16:colId xmlns="" xmlns:a16="http://schemas.microsoft.com/office/drawing/2014/main" val="2699121428"/>
                     </a:ext>
                   </a:extLst>
                 </a:gridCol>
@@ -14766,7 +14841,7 @@
                 </a:tc>
                 <a:extLst>
                   <a:ext uri="{0D108BD9-81ED-4DB2-BD59-A6C34878D82A}">
-                    <a16:rowId xmlns:a16="http://schemas.microsoft.com/office/drawing/2014/main" xmlns="" val="2931909680"/>
+                    <a16:rowId xmlns="" xmlns:a16="http://schemas.microsoft.com/office/drawing/2014/main" val="2931909680"/>
                   </a:ext>
                 </a:extLst>
               </a:tr>
@@ -14812,7 +14887,7 @@
                 </a:tc>
                 <a:extLst>
                   <a:ext uri="{0D108BD9-81ED-4DB2-BD59-A6C34878D82A}">
-                    <a16:rowId xmlns:a16="http://schemas.microsoft.com/office/drawing/2014/main" xmlns="" val="3527519372"/>
+                    <a16:rowId xmlns="" xmlns:a16="http://schemas.microsoft.com/office/drawing/2014/main" val="3527519372"/>
                   </a:ext>
                 </a:extLst>
               </a:tr>
@@ -14920,7 +14995,7 @@
                 </a:tc>
                 <a:extLst>
                   <a:ext uri="{0D108BD9-81ED-4DB2-BD59-A6C34878D82A}">
-                    <a16:rowId xmlns:a16="http://schemas.microsoft.com/office/drawing/2014/main" xmlns="" val="2000888641"/>
+                    <a16:rowId xmlns="" xmlns:a16="http://schemas.microsoft.com/office/drawing/2014/main" val="2000888641"/>
                   </a:ext>
                 </a:extLst>
               </a:tr>
@@ -14933,7 +15008,7 @@
           <p:cNvPr id="4" name="TextBox 3">
             <a:extLst>
               <a:ext uri="{FF2B5EF4-FFF2-40B4-BE49-F238E27FC236}">
-                <a16:creationId xmlns:a16="http://schemas.microsoft.com/office/drawing/2014/main" xmlns="" id="{CA943360-CCDB-A34A-1BAE-75E33B3EF69D}"/>
+                <a16:creationId xmlns="" xmlns:a16="http://schemas.microsoft.com/office/drawing/2014/main" id="{CA943360-CCDB-A34A-1BAE-75E33B3EF69D}"/>
               </a:ext>
             </a:extLst>
           </p:cNvPr>
@@ -15027,7 +15102,7 @@
     </p:spTree>
     <p:extLst>
       <p:ext uri="{BB962C8B-B14F-4D97-AF65-F5344CB8AC3E}">
-        <p14:creationId xmlns:p14="http://schemas.microsoft.com/office/powerpoint/2010/main" xmlns="" val="3945166475"/>
+        <p14:creationId xmlns="" xmlns:p14="http://schemas.microsoft.com/office/powerpoint/2010/main" val="3945166475"/>
       </p:ext>
     </p:extLst>
   </p:cSld>
@@ -15131,7 +15206,7 @@
           <p:cNvPr id="20" name="Picture 4" descr="MSc Cognitive Science Admission 2014-15, Indian Institute of Technology (IIT),  Gandhinagar">
             <a:extLst>
               <a:ext uri="{FF2B5EF4-FFF2-40B4-BE49-F238E27FC236}">
-                <a16:creationId xmlns:a16="http://schemas.microsoft.com/office/drawing/2014/main" xmlns="" id="{84C602A4-83A1-4E16-A980-2A9259BCC373}"/>
+                <a16:creationId xmlns="" xmlns:a16="http://schemas.microsoft.com/office/drawing/2014/main" id="{84C602A4-83A1-4E16-A980-2A9259BCC373}"/>
               </a:ext>
             </a:extLst>
           </p:cNvPr>
@@ -15144,7 +15219,7 @@
           <a:blip r:embed="rId3" cstate="print">
             <a:extLst>
               <a:ext uri="{28A0092B-C50C-407E-A947-70E740481C1C}">
-                <a14:useLocalDpi xmlns:a14="http://schemas.microsoft.com/office/drawing/2010/main" xmlns="" val="0"/>
+                <a14:useLocalDpi xmlns="" xmlns:a14="http://schemas.microsoft.com/office/drawing/2010/main" val="0"/>
               </a:ext>
             </a:extLst>
           </a:blip>
@@ -15164,7 +15239,7 @@
           <a:noFill/>
           <a:extLst>
             <a:ext uri="{909E8E84-426E-40DD-AFC4-6F175D3DCCD1}">
-              <a14:hiddenFill xmlns:a14="http://schemas.microsoft.com/office/drawing/2010/main" xmlns="">
+              <a14:hiddenFill xmlns="" xmlns:a14="http://schemas.microsoft.com/office/drawing/2010/main">
                 <a:solidFill>
                   <a:srgbClr val="FFFFFF"/>
                 </a:solidFill>
@@ -15268,7 +15343,7 @@
           <p:cNvPr id="6" name="Picture 5">
             <a:extLst>
               <a:ext uri="{FF2B5EF4-FFF2-40B4-BE49-F238E27FC236}">
-                <a16:creationId xmlns:a16="http://schemas.microsoft.com/office/drawing/2014/main" xmlns="" id="{8E0D68E5-C559-77A6-3B81-5313A0A961F2}"/>
+                <a16:creationId xmlns="" xmlns:a16="http://schemas.microsoft.com/office/drawing/2014/main" id="{8E0D68E5-C559-77A6-3B81-5313A0A961F2}"/>
               </a:ext>
             </a:extLst>
           </p:cNvPr>
@@ -15281,7 +15356,7 @@
           <a:blip r:embed="rId4" cstate="print">
             <a:extLst>
               <a:ext uri="{28A0092B-C50C-407E-A947-70E740481C1C}">
-                <a14:useLocalDpi xmlns:a14="http://schemas.microsoft.com/office/drawing/2010/main" xmlns="" val="0"/>
+                <a14:useLocalDpi xmlns="" xmlns:a14="http://schemas.microsoft.com/office/drawing/2010/main" val="0"/>
               </a:ext>
             </a:extLst>
           </a:blip>
@@ -15304,7 +15379,7 @@
           <p:cNvPr id="2" name="Table 3">
             <a:extLst>
               <a:ext uri="{FF2B5EF4-FFF2-40B4-BE49-F238E27FC236}">
-                <a16:creationId xmlns:a16="http://schemas.microsoft.com/office/drawing/2014/main" xmlns="" id="{7B154797-2D6E-0657-51A2-67D08813F457}"/>
+                <a16:creationId xmlns="" xmlns:a16="http://schemas.microsoft.com/office/drawing/2014/main" id="{7B154797-2D6E-0657-51A2-67D08813F457}"/>
               </a:ext>
             </a:extLst>
           </p:cNvPr>
@@ -15314,7 +15389,7 @@
           <p:nvPr>
             <p:extLst>
               <p:ext uri="{D42A27DB-BD31-4B8C-83A1-F6EECF244321}">
-                <p14:modId xmlns:p14="http://schemas.microsoft.com/office/powerpoint/2010/main" xmlns="" val="1813915914"/>
+                <p14:modId xmlns="" xmlns:p14="http://schemas.microsoft.com/office/powerpoint/2010/main" val="1813915914"/>
               </p:ext>
             </p:extLst>
           </p:nvPr>
@@ -15334,14 +15409,14 @@
                 <a:gridCol w="5521262">
                   <a:extLst>
                     <a:ext uri="{9D8B030D-6E8A-4147-A177-3AD203B41FA5}">
-                      <a16:colId xmlns:a16="http://schemas.microsoft.com/office/drawing/2014/main" xmlns="" val="110231139"/>
+                      <a16:colId xmlns="" xmlns:a16="http://schemas.microsoft.com/office/drawing/2014/main" val="110231139"/>
                     </a:ext>
                   </a:extLst>
                 </a:gridCol>
                 <a:gridCol w="1981201">
                   <a:extLst>
                     <a:ext uri="{9D8B030D-6E8A-4147-A177-3AD203B41FA5}">
-                      <a16:colId xmlns:a16="http://schemas.microsoft.com/office/drawing/2014/main" xmlns="" val="2699121428"/>
+                      <a16:colId xmlns="" xmlns:a16="http://schemas.microsoft.com/office/drawing/2014/main" val="2699121428"/>
                     </a:ext>
                   </a:extLst>
                 </a:gridCol>
@@ -15392,7 +15467,7 @@
                 </a:tc>
                 <a:extLst>
                   <a:ext uri="{0D108BD9-81ED-4DB2-BD59-A6C34878D82A}">
-                    <a16:rowId xmlns:a16="http://schemas.microsoft.com/office/drawing/2014/main" xmlns="" val="2931909680"/>
+                    <a16:rowId xmlns="" xmlns:a16="http://schemas.microsoft.com/office/drawing/2014/main" val="2931909680"/>
                   </a:ext>
                 </a:extLst>
               </a:tr>
@@ -15447,7 +15522,7 @@
                 </a:tc>
                 <a:extLst>
                   <a:ext uri="{0D108BD9-81ED-4DB2-BD59-A6C34878D82A}">
-                    <a16:rowId xmlns:a16="http://schemas.microsoft.com/office/drawing/2014/main" xmlns="" val="3527519372"/>
+                    <a16:rowId xmlns="" xmlns:a16="http://schemas.microsoft.com/office/drawing/2014/main" val="3527519372"/>
                   </a:ext>
                 </a:extLst>
               </a:tr>
@@ -15519,7 +15594,7 @@
                 </a:tc>
                 <a:extLst>
                   <a:ext uri="{0D108BD9-81ED-4DB2-BD59-A6C34878D82A}">
-                    <a16:rowId xmlns:a16="http://schemas.microsoft.com/office/drawing/2014/main" xmlns="" val="2000888641"/>
+                    <a16:rowId xmlns="" xmlns:a16="http://schemas.microsoft.com/office/drawing/2014/main" val="2000888641"/>
                   </a:ext>
                 </a:extLst>
               </a:tr>
@@ -15593,7 +15668,7 @@
                 </a:tc>
                 <a:extLst>
                   <a:ext uri="{0D108BD9-81ED-4DB2-BD59-A6C34878D82A}">
-                    <a16:rowId xmlns:a16="http://schemas.microsoft.com/office/drawing/2014/main" xmlns="" val="2700886337"/>
+                    <a16:rowId xmlns="" xmlns:a16="http://schemas.microsoft.com/office/drawing/2014/main" val="2700886337"/>
                   </a:ext>
                 </a:extLst>
               </a:tr>
@@ -15648,7 +15723,7 @@
                 </a:tc>
                 <a:extLst>
                   <a:ext uri="{0D108BD9-81ED-4DB2-BD59-A6C34878D82A}">
-                    <a16:rowId xmlns:a16="http://schemas.microsoft.com/office/drawing/2014/main" xmlns="" val="4085207208"/>
+                    <a16:rowId xmlns="" xmlns:a16="http://schemas.microsoft.com/office/drawing/2014/main" val="4085207208"/>
                   </a:ext>
                 </a:extLst>
               </a:tr>
@@ -16129,7 +16204,7 @@
           <p:cNvPr id="4" name="TextBox 3">
             <a:extLst>
               <a:ext uri="{FF2B5EF4-FFF2-40B4-BE49-F238E27FC236}">
-                <a16:creationId xmlns:a16="http://schemas.microsoft.com/office/drawing/2014/main" xmlns="" id="{CA943360-CCDB-A34A-1BAE-75E33B3EF69D}"/>
+                <a16:creationId xmlns="" xmlns:a16="http://schemas.microsoft.com/office/drawing/2014/main" id="{CA943360-CCDB-A34A-1BAE-75E33B3EF69D}"/>
               </a:ext>
             </a:extLst>
           </p:cNvPr>
@@ -16188,7 +16263,7 @@
     </p:spTree>
     <p:extLst>
       <p:ext uri="{BB962C8B-B14F-4D97-AF65-F5344CB8AC3E}">
-        <p14:creationId xmlns:p14="http://schemas.microsoft.com/office/powerpoint/2010/main" xmlns="" val="3945166475"/>
+        <p14:creationId xmlns="" xmlns:p14="http://schemas.microsoft.com/office/powerpoint/2010/main" val="3945166475"/>
       </p:ext>
     </p:extLst>
   </p:cSld>

</xml_diff>